<commit_message>
Add extremely basic export functionality
If you click the export button, you'll download a file automatically...
it's svg but you have to rename it for it to work this way (at least
with chrome). Styles for the AA charts had to be moved inside the sites_svg
so that they would export along with the rest.
</commit_message>
<xml_diff>
--- a/slides-nkullman-gclenagh-wfyang.pptx
+++ b/slides-nkullman-gclenagh-wfyang.pptx
@@ -109,6 +109,11 @@
       </a:defRPr>
     </a:lvl9pPr>
   </p:defaultTextStyle>
+  <p:extLst>
+    <p:ext uri="{EFAFB233-063F-42B5-8137-9DF3F51BA10A}">
+      <p15:sldGuideLst xmlns:p15="http://schemas.microsoft.com/office/powerpoint/2012/main"/>
+    </p:ext>
+  </p:extLst>
 </p:presentation>
 </file>
 
@@ -305,6 +310,536 @@
 </file>
 
 <file path=ppt/slideLayouts/slideLayout10.xml><?xml version="1.0" encoding="utf-8"?>
+<p:sldLayout xmlns:a="http://schemas.openxmlformats.org/drawingml/2006/main" xmlns:r="http://schemas.openxmlformats.org/officeDocument/2006/relationships" xmlns:p="http://schemas.openxmlformats.org/presentationml/2006/main" type="objTx" preserve="1">
+  <p:cSld name="Content with Caption">
+    <p:spTree>
+      <p:nvGrpSpPr>
+        <p:cNvPr id="1" name=""/>
+        <p:cNvGrpSpPr/>
+        <p:nvPr/>
+      </p:nvGrpSpPr>
+      <p:grpSpPr>
+        <a:xfrm>
+          <a:off x="0" y="0"/>
+          <a:ext cx="0" cy="0"/>
+          <a:chOff x="0" y="0"/>
+          <a:chExt cx="0" cy="0"/>
+        </a:xfrm>
+      </p:grpSpPr>
+      <p:sp>
+        <p:nvSpPr>
+          <p:cNvPr id="2" name="Title 1"/>
+          <p:cNvSpPr>
+            <a:spLocks noGrp="1"/>
+          </p:cNvSpPr>
+          <p:nvPr>
+            <p:ph type="title"/>
+          </p:nvPr>
+        </p:nvSpPr>
+        <p:spPr>
+          <a:xfrm>
+            <a:off x="839788" y="457200"/>
+            <a:ext cx="3932237" cy="1600200"/>
+          </a:xfrm>
+        </p:spPr>
+        <p:txBody>
+          <a:bodyPr anchor="b"/>
+          <a:lstStyle>
+            <a:lvl1pPr>
+              <a:defRPr sz="3200"/>
+            </a:lvl1pPr>
+          </a:lstStyle>
+          <a:p>
+            <a:r>
+              <a:rPr lang="en-US" smtClean="0"/>
+              <a:t>Click to edit Master title style</a:t>
+            </a:r>
+            <a:endParaRPr lang="en-US"/>
+          </a:p>
+        </p:txBody>
+      </p:sp>
+      <p:sp>
+        <p:nvSpPr>
+          <p:cNvPr id="3" name="Content Placeholder 2"/>
+          <p:cNvSpPr>
+            <a:spLocks noGrp="1"/>
+          </p:cNvSpPr>
+          <p:nvPr>
+            <p:ph idx="1"/>
+          </p:nvPr>
+        </p:nvSpPr>
+        <p:spPr>
+          <a:xfrm>
+            <a:off x="5183188" y="987425"/>
+            <a:ext cx="6172200" cy="4873625"/>
+          </a:xfrm>
+        </p:spPr>
+        <p:txBody>
+          <a:bodyPr/>
+          <a:lstStyle>
+            <a:lvl1pPr>
+              <a:defRPr sz="3200"/>
+            </a:lvl1pPr>
+            <a:lvl2pPr>
+              <a:defRPr sz="2800"/>
+            </a:lvl2pPr>
+            <a:lvl3pPr>
+              <a:defRPr sz="2400"/>
+            </a:lvl3pPr>
+            <a:lvl4pPr>
+              <a:defRPr sz="2000"/>
+            </a:lvl4pPr>
+            <a:lvl5pPr>
+              <a:defRPr sz="2000"/>
+            </a:lvl5pPr>
+            <a:lvl6pPr>
+              <a:defRPr sz="2000"/>
+            </a:lvl6pPr>
+            <a:lvl7pPr>
+              <a:defRPr sz="2000"/>
+            </a:lvl7pPr>
+            <a:lvl8pPr>
+              <a:defRPr sz="2000"/>
+            </a:lvl8pPr>
+            <a:lvl9pPr>
+              <a:defRPr sz="2000"/>
+            </a:lvl9pPr>
+          </a:lstStyle>
+          <a:p>
+            <a:pPr lvl="0"/>
+            <a:r>
+              <a:rPr lang="en-US" smtClean="0"/>
+              <a:t>Click to edit Master text styles</a:t>
+            </a:r>
+          </a:p>
+          <a:p>
+            <a:pPr lvl="1"/>
+            <a:r>
+              <a:rPr lang="en-US" smtClean="0"/>
+              <a:t>Second level</a:t>
+            </a:r>
+          </a:p>
+          <a:p>
+            <a:pPr lvl="2"/>
+            <a:r>
+              <a:rPr lang="en-US" smtClean="0"/>
+              <a:t>Third level</a:t>
+            </a:r>
+          </a:p>
+          <a:p>
+            <a:pPr lvl="3"/>
+            <a:r>
+              <a:rPr lang="en-US" smtClean="0"/>
+              <a:t>Fourth level</a:t>
+            </a:r>
+          </a:p>
+          <a:p>
+            <a:pPr lvl="4"/>
+            <a:r>
+              <a:rPr lang="en-US" smtClean="0"/>
+              <a:t>Fifth level</a:t>
+            </a:r>
+            <a:endParaRPr lang="en-US"/>
+          </a:p>
+        </p:txBody>
+      </p:sp>
+      <p:sp>
+        <p:nvSpPr>
+          <p:cNvPr id="4" name="Text Placeholder 3"/>
+          <p:cNvSpPr>
+            <a:spLocks noGrp="1"/>
+          </p:cNvSpPr>
+          <p:nvPr>
+            <p:ph type="body" sz="half" idx="2"/>
+          </p:nvPr>
+        </p:nvSpPr>
+        <p:spPr>
+          <a:xfrm>
+            <a:off x="839788" y="2057400"/>
+            <a:ext cx="3932237" cy="3811588"/>
+          </a:xfrm>
+        </p:spPr>
+        <p:txBody>
+          <a:bodyPr/>
+          <a:lstStyle>
+            <a:lvl1pPr marL="0" indent="0">
+              <a:buNone/>
+              <a:defRPr sz="1600"/>
+            </a:lvl1pPr>
+            <a:lvl2pPr marL="457200" indent="0">
+              <a:buNone/>
+              <a:defRPr sz="1400"/>
+            </a:lvl2pPr>
+            <a:lvl3pPr marL="914400" indent="0">
+              <a:buNone/>
+              <a:defRPr sz="1200"/>
+            </a:lvl3pPr>
+            <a:lvl4pPr marL="1371600" indent="0">
+              <a:buNone/>
+              <a:defRPr sz="1000"/>
+            </a:lvl4pPr>
+            <a:lvl5pPr marL="1828800" indent="0">
+              <a:buNone/>
+              <a:defRPr sz="1000"/>
+            </a:lvl5pPr>
+            <a:lvl6pPr marL="2286000" indent="0">
+              <a:buNone/>
+              <a:defRPr sz="1000"/>
+            </a:lvl6pPr>
+            <a:lvl7pPr marL="2743200" indent="0">
+              <a:buNone/>
+              <a:defRPr sz="1000"/>
+            </a:lvl7pPr>
+            <a:lvl8pPr marL="3200400" indent="0">
+              <a:buNone/>
+              <a:defRPr sz="1000"/>
+            </a:lvl8pPr>
+            <a:lvl9pPr marL="3657600" indent="0">
+              <a:buNone/>
+              <a:defRPr sz="1000"/>
+            </a:lvl9pPr>
+          </a:lstStyle>
+          <a:p>
+            <a:pPr lvl="0"/>
+            <a:r>
+              <a:rPr lang="en-US" smtClean="0"/>
+              <a:t>Click to edit Master text styles</a:t>
+            </a:r>
+          </a:p>
+        </p:txBody>
+      </p:sp>
+      <p:sp>
+        <p:nvSpPr>
+          <p:cNvPr id="5" name="Date Placeholder 4"/>
+          <p:cNvSpPr>
+            <a:spLocks noGrp="1"/>
+          </p:cNvSpPr>
+          <p:nvPr>
+            <p:ph type="dt" sz="half" idx="10"/>
+          </p:nvPr>
+        </p:nvSpPr>
+        <p:spPr/>
+        <p:txBody>
+          <a:bodyPr/>
+          <a:lstStyle/>
+          <a:p>
+            <a:fld id="{C8A9F8E6-4BC3-4202-8597-429C04A5B1F9}" type="datetimeFigureOut">
+              <a:rPr lang="en-US" smtClean="0"/>
+              <a:t>5/19/2015</a:t>
+            </a:fld>
+            <a:endParaRPr lang="en-US"/>
+          </a:p>
+        </p:txBody>
+      </p:sp>
+      <p:sp>
+        <p:nvSpPr>
+          <p:cNvPr id="6" name="Footer Placeholder 5"/>
+          <p:cNvSpPr>
+            <a:spLocks noGrp="1"/>
+          </p:cNvSpPr>
+          <p:nvPr>
+            <p:ph type="ftr" sz="quarter" idx="11"/>
+          </p:nvPr>
+        </p:nvSpPr>
+        <p:spPr/>
+        <p:txBody>
+          <a:bodyPr/>
+          <a:lstStyle/>
+          <a:p>
+            <a:endParaRPr lang="en-US"/>
+          </a:p>
+        </p:txBody>
+      </p:sp>
+      <p:sp>
+        <p:nvSpPr>
+          <p:cNvPr id="7" name="Slide Number Placeholder 6"/>
+          <p:cNvSpPr>
+            <a:spLocks noGrp="1"/>
+          </p:cNvSpPr>
+          <p:nvPr>
+            <p:ph type="sldNum" sz="quarter" idx="12"/>
+          </p:nvPr>
+        </p:nvSpPr>
+        <p:spPr/>
+        <p:txBody>
+          <a:bodyPr/>
+          <a:lstStyle/>
+          <a:p>
+            <a:fld id="{C01F2AEF-5F40-4DB4-9E0D-8EEE1B8C1150}" type="slidenum">
+              <a:rPr lang="en-US" smtClean="0"/>
+              <a:t>‹#›</a:t>
+            </a:fld>
+            <a:endParaRPr lang="en-US"/>
+          </a:p>
+        </p:txBody>
+      </p:sp>
+    </p:spTree>
+    <p:extLst>
+      <p:ext uri="{BB962C8B-B14F-4D97-AF65-F5344CB8AC3E}">
+        <p14:creationId xmlns:p14="http://schemas.microsoft.com/office/powerpoint/2010/main" val="2743341430"/>
+      </p:ext>
+    </p:extLst>
+  </p:cSld>
+  <p:clrMapOvr>
+    <a:masterClrMapping/>
+  </p:clrMapOvr>
+</p:sldLayout>
+</file>
+
+<file path=ppt/slideLayouts/slideLayout11.xml><?xml version="1.0" encoding="utf-8"?>
+<p:sldLayout xmlns:a="http://schemas.openxmlformats.org/drawingml/2006/main" xmlns:r="http://schemas.openxmlformats.org/officeDocument/2006/relationships" xmlns:p="http://schemas.openxmlformats.org/presentationml/2006/main" type="picTx" preserve="1">
+  <p:cSld name="Picture with Caption">
+    <p:spTree>
+      <p:nvGrpSpPr>
+        <p:cNvPr id="1" name=""/>
+        <p:cNvGrpSpPr/>
+        <p:nvPr/>
+      </p:nvGrpSpPr>
+      <p:grpSpPr>
+        <a:xfrm>
+          <a:off x="0" y="0"/>
+          <a:ext cx="0" cy="0"/>
+          <a:chOff x="0" y="0"/>
+          <a:chExt cx="0" cy="0"/>
+        </a:xfrm>
+      </p:grpSpPr>
+      <p:sp>
+        <p:nvSpPr>
+          <p:cNvPr id="2" name="Title 1"/>
+          <p:cNvSpPr>
+            <a:spLocks noGrp="1"/>
+          </p:cNvSpPr>
+          <p:nvPr>
+            <p:ph type="title"/>
+          </p:nvPr>
+        </p:nvSpPr>
+        <p:spPr>
+          <a:xfrm>
+            <a:off x="839788" y="457200"/>
+            <a:ext cx="3932237" cy="1600200"/>
+          </a:xfrm>
+        </p:spPr>
+        <p:txBody>
+          <a:bodyPr anchor="b"/>
+          <a:lstStyle>
+            <a:lvl1pPr>
+              <a:defRPr sz="3200"/>
+            </a:lvl1pPr>
+          </a:lstStyle>
+          <a:p>
+            <a:r>
+              <a:rPr lang="en-US" smtClean="0"/>
+              <a:t>Click to edit Master title style</a:t>
+            </a:r>
+            <a:endParaRPr lang="en-US"/>
+          </a:p>
+        </p:txBody>
+      </p:sp>
+      <p:sp>
+        <p:nvSpPr>
+          <p:cNvPr id="3" name="Picture Placeholder 2"/>
+          <p:cNvSpPr>
+            <a:spLocks noGrp="1"/>
+          </p:cNvSpPr>
+          <p:nvPr>
+            <p:ph type="pic" idx="1"/>
+          </p:nvPr>
+        </p:nvSpPr>
+        <p:spPr>
+          <a:xfrm>
+            <a:off x="5183188" y="987425"/>
+            <a:ext cx="6172200" cy="4873625"/>
+          </a:xfrm>
+        </p:spPr>
+        <p:txBody>
+          <a:bodyPr/>
+          <a:lstStyle>
+            <a:lvl1pPr marL="0" indent="0">
+              <a:buNone/>
+              <a:defRPr sz="3200"/>
+            </a:lvl1pPr>
+            <a:lvl2pPr marL="457200" indent="0">
+              <a:buNone/>
+              <a:defRPr sz="2800"/>
+            </a:lvl2pPr>
+            <a:lvl3pPr marL="914400" indent="0">
+              <a:buNone/>
+              <a:defRPr sz="2400"/>
+            </a:lvl3pPr>
+            <a:lvl4pPr marL="1371600" indent="0">
+              <a:buNone/>
+              <a:defRPr sz="2000"/>
+            </a:lvl4pPr>
+            <a:lvl5pPr marL="1828800" indent="0">
+              <a:buNone/>
+              <a:defRPr sz="2000"/>
+            </a:lvl5pPr>
+            <a:lvl6pPr marL="2286000" indent="0">
+              <a:buNone/>
+              <a:defRPr sz="2000"/>
+            </a:lvl6pPr>
+            <a:lvl7pPr marL="2743200" indent="0">
+              <a:buNone/>
+              <a:defRPr sz="2000"/>
+            </a:lvl7pPr>
+            <a:lvl8pPr marL="3200400" indent="0">
+              <a:buNone/>
+              <a:defRPr sz="2000"/>
+            </a:lvl8pPr>
+            <a:lvl9pPr marL="3657600" indent="0">
+              <a:buNone/>
+              <a:defRPr sz="2000"/>
+            </a:lvl9pPr>
+          </a:lstStyle>
+          <a:p>
+            <a:endParaRPr lang="en-US"/>
+          </a:p>
+        </p:txBody>
+      </p:sp>
+      <p:sp>
+        <p:nvSpPr>
+          <p:cNvPr id="4" name="Text Placeholder 3"/>
+          <p:cNvSpPr>
+            <a:spLocks noGrp="1"/>
+          </p:cNvSpPr>
+          <p:nvPr>
+            <p:ph type="body" sz="half" idx="2"/>
+          </p:nvPr>
+        </p:nvSpPr>
+        <p:spPr>
+          <a:xfrm>
+            <a:off x="839788" y="2057400"/>
+            <a:ext cx="3932237" cy="3811588"/>
+          </a:xfrm>
+        </p:spPr>
+        <p:txBody>
+          <a:bodyPr/>
+          <a:lstStyle>
+            <a:lvl1pPr marL="0" indent="0">
+              <a:buNone/>
+              <a:defRPr sz="1600"/>
+            </a:lvl1pPr>
+            <a:lvl2pPr marL="457200" indent="0">
+              <a:buNone/>
+              <a:defRPr sz="1400"/>
+            </a:lvl2pPr>
+            <a:lvl3pPr marL="914400" indent="0">
+              <a:buNone/>
+              <a:defRPr sz="1200"/>
+            </a:lvl3pPr>
+            <a:lvl4pPr marL="1371600" indent="0">
+              <a:buNone/>
+              <a:defRPr sz="1000"/>
+            </a:lvl4pPr>
+            <a:lvl5pPr marL="1828800" indent="0">
+              <a:buNone/>
+              <a:defRPr sz="1000"/>
+            </a:lvl5pPr>
+            <a:lvl6pPr marL="2286000" indent="0">
+              <a:buNone/>
+              <a:defRPr sz="1000"/>
+            </a:lvl6pPr>
+            <a:lvl7pPr marL="2743200" indent="0">
+              <a:buNone/>
+              <a:defRPr sz="1000"/>
+            </a:lvl7pPr>
+            <a:lvl8pPr marL="3200400" indent="0">
+              <a:buNone/>
+              <a:defRPr sz="1000"/>
+            </a:lvl8pPr>
+            <a:lvl9pPr marL="3657600" indent="0">
+              <a:buNone/>
+              <a:defRPr sz="1000"/>
+            </a:lvl9pPr>
+          </a:lstStyle>
+          <a:p>
+            <a:pPr lvl="0"/>
+            <a:r>
+              <a:rPr lang="en-US" smtClean="0"/>
+              <a:t>Click to edit Master text styles</a:t>
+            </a:r>
+          </a:p>
+        </p:txBody>
+      </p:sp>
+      <p:sp>
+        <p:nvSpPr>
+          <p:cNvPr id="5" name="Date Placeholder 4"/>
+          <p:cNvSpPr>
+            <a:spLocks noGrp="1"/>
+          </p:cNvSpPr>
+          <p:nvPr>
+            <p:ph type="dt" sz="half" idx="10"/>
+          </p:nvPr>
+        </p:nvSpPr>
+        <p:spPr/>
+        <p:txBody>
+          <a:bodyPr/>
+          <a:lstStyle/>
+          <a:p>
+            <a:fld id="{C8A9F8E6-4BC3-4202-8597-429C04A5B1F9}" type="datetimeFigureOut">
+              <a:rPr lang="en-US" smtClean="0"/>
+              <a:t>5/19/2015</a:t>
+            </a:fld>
+            <a:endParaRPr lang="en-US"/>
+          </a:p>
+        </p:txBody>
+      </p:sp>
+      <p:sp>
+        <p:nvSpPr>
+          <p:cNvPr id="6" name="Footer Placeholder 5"/>
+          <p:cNvSpPr>
+            <a:spLocks noGrp="1"/>
+          </p:cNvSpPr>
+          <p:nvPr>
+            <p:ph type="ftr" sz="quarter" idx="11"/>
+          </p:nvPr>
+        </p:nvSpPr>
+        <p:spPr/>
+        <p:txBody>
+          <a:bodyPr/>
+          <a:lstStyle/>
+          <a:p>
+            <a:endParaRPr lang="en-US"/>
+          </a:p>
+        </p:txBody>
+      </p:sp>
+      <p:sp>
+        <p:nvSpPr>
+          <p:cNvPr id="7" name="Slide Number Placeholder 6"/>
+          <p:cNvSpPr>
+            <a:spLocks noGrp="1"/>
+          </p:cNvSpPr>
+          <p:nvPr>
+            <p:ph type="sldNum" sz="quarter" idx="12"/>
+          </p:nvPr>
+        </p:nvSpPr>
+        <p:spPr/>
+        <p:txBody>
+          <a:bodyPr/>
+          <a:lstStyle/>
+          <a:p>
+            <a:fld id="{C01F2AEF-5F40-4DB4-9E0D-8EEE1B8C1150}" type="slidenum">
+              <a:rPr lang="en-US" smtClean="0"/>
+              <a:t>‹#›</a:t>
+            </a:fld>
+            <a:endParaRPr lang="en-US"/>
+          </a:p>
+        </p:txBody>
+      </p:sp>
+    </p:spTree>
+    <p:extLst>
+      <p:ext uri="{BB962C8B-B14F-4D97-AF65-F5344CB8AC3E}">
+        <p14:creationId xmlns:p14="http://schemas.microsoft.com/office/powerpoint/2010/main" val="2190140718"/>
+      </p:ext>
+    </p:extLst>
+  </p:cSld>
+  <p:clrMapOvr>
+    <a:masterClrMapping/>
+  </p:clrMapOvr>
+</p:sldLayout>
+</file>
+
+<file path=ppt/slideLayouts/slideLayout12.xml><?xml version="1.0" encoding="utf-8"?>
 <p:sldLayout xmlns:a="http://schemas.openxmlformats.org/drawingml/2006/main" xmlns:r="http://schemas.openxmlformats.org/officeDocument/2006/relationships" xmlns:p="http://schemas.openxmlformats.org/presentationml/2006/main" type="vertTx" preserve="1">
   <p:cSld name="Title and Vertical Text">
     <p:spTree>
@@ -474,7 +1009,7 @@
 </p:sldLayout>
 </file>
 
-<file path=ppt/slideLayouts/slideLayout11.xml><?xml version="1.0" encoding="utf-8"?>
+<file path=ppt/slideLayouts/slideLayout13.xml><?xml version="1.0" encoding="utf-8"?>
 <p:sldLayout xmlns:a="http://schemas.openxmlformats.org/drawingml/2006/main" xmlns:r="http://schemas.openxmlformats.org/officeDocument/2006/relationships" xmlns:p="http://schemas.openxmlformats.org/presentationml/2006/main" type="vertTitleAndTx" preserve="1">
   <p:cSld name="Vertical Title and Text">
     <p:spTree>
@@ -681,16 +1216,27 @@
             <p:ph type="title"/>
           </p:nvPr>
         </p:nvSpPr>
-        <p:spPr/>
-        <p:txBody>
-          <a:bodyPr/>
-          <a:lstStyle/>
-          <a:p>
-            <a:r>
-              <a:rPr lang="en-US" smtClean="0"/>
+        <p:spPr>
+          <a:xfrm>
+            <a:off x="838200" y="365126"/>
+            <a:ext cx="7772400" cy="877888"/>
+          </a:xfrm>
+        </p:spPr>
+        <p:txBody>
+          <a:bodyPr anchor="t">
+            <a:normAutofit/>
+          </a:bodyPr>
+          <a:lstStyle>
+            <a:lvl1pPr>
+              <a:defRPr sz="4000"/>
+            </a:lvl1pPr>
+          </a:lstStyle>
+          <a:p>
+            <a:r>
+              <a:rPr lang="en-US" dirty="0" smtClean="0"/>
               <a:t>Click to edit Master title style</a:t>
             </a:r>
-            <a:endParaRPr lang="en-US"/>
+            <a:endParaRPr lang="en-US" dirty="0"/>
           </a:p>
         </p:txBody>
       </p:sp>
@@ -704,45 +1250,50 @@
             <p:ph idx="1"/>
           </p:nvPr>
         </p:nvSpPr>
-        <p:spPr/>
+        <p:spPr>
+          <a:xfrm>
+            <a:off x="838200" y="1571625"/>
+            <a:ext cx="7772400" cy="4605338"/>
+          </a:xfrm>
+        </p:spPr>
         <p:txBody>
           <a:bodyPr/>
           <a:lstStyle/>
           <a:p>
             <a:pPr lvl="0"/>
             <a:r>
-              <a:rPr lang="en-US" smtClean="0"/>
+              <a:rPr lang="en-US" dirty="0" smtClean="0"/>
               <a:t>Click to edit Master text styles</a:t>
             </a:r>
           </a:p>
           <a:p>
             <a:pPr lvl="1"/>
             <a:r>
-              <a:rPr lang="en-US" smtClean="0"/>
+              <a:rPr lang="en-US" dirty="0" smtClean="0"/>
               <a:t>Second level</a:t>
             </a:r>
           </a:p>
           <a:p>
             <a:pPr lvl="2"/>
             <a:r>
-              <a:rPr lang="en-US" smtClean="0"/>
+              <a:rPr lang="en-US" dirty="0" smtClean="0"/>
               <a:t>Third level</a:t>
             </a:r>
           </a:p>
           <a:p>
             <a:pPr lvl="3"/>
             <a:r>
-              <a:rPr lang="en-US" smtClean="0"/>
+              <a:rPr lang="en-US" dirty="0" smtClean="0"/>
               <a:t>Fourth level</a:t>
             </a:r>
           </a:p>
           <a:p>
             <a:pPr lvl="4"/>
             <a:r>
-              <a:rPr lang="en-US" smtClean="0"/>
+              <a:rPr lang="en-US" dirty="0" smtClean="0"/>
               <a:t>Fifth level</a:t>
             </a:r>
-            <a:endParaRPr lang="en-US"/>
+            <a:endParaRPr lang="en-US" dirty="0"/>
           </a:p>
         </p:txBody>
       </p:sp>
@@ -1303,6 +1854,238 @@
 </file>
 
 <file path=ppt/slideLayouts/slideLayout5.xml><?xml version="1.0" encoding="utf-8"?>
+<p:sldLayout xmlns:a="http://schemas.openxmlformats.org/drawingml/2006/main" xmlns:r="http://schemas.openxmlformats.org/officeDocument/2006/relationships" xmlns:p="http://schemas.openxmlformats.org/presentationml/2006/main" type="twoObj" preserve="1">
+  <p:cSld name="1_Two Content">
+    <p:spTree>
+      <p:nvGrpSpPr>
+        <p:cNvPr id="1" name=""/>
+        <p:cNvGrpSpPr/>
+        <p:nvPr/>
+      </p:nvGrpSpPr>
+      <p:grpSpPr>
+        <a:xfrm>
+          <a:off x="0" y="0"/>
+          <a:ext cx="0" cy="0"/>
+          <a:chOff x="0" y="0"/>
+          <a:chExt cx="0" cy="0"/>
+        </a:xfrm>
+      </p:grpSpPr>
+      <p:sp>
+        <p:nvSpPr>
+          <p:cNvPr id="2" name="Title 1"/>
+          <p:cNvSpPr>
+            <a:spLocks noGrp="1"/>
+          </p:cNvSpPr>
+          <p:nvPr>
+            <p:ph type="title"/>
+          </p:nvPr>
+        </p:nvSpPr>
+        <p:spPr/>
+        <p:txBody>
+          <a:bodyPr/>
+          <a:lstStyle/>
+          <a:p>
+            <a:r>
+              <a:rPr lang="en-US" smtClean="0"/>
+              <a:t>Click to edit Master title style</a:t>
+            </a:r>
+            <a:endParaRPr lang="en-US"/>
+          </a:p>
+        </p:txBody>
+      </p:sp>
+      <p:sp>
+        <p:nvSpPr>
+          <p:cNvPr id="3" name="Content Placeholder 2"/>
+          <p:cNvSpPr>
+            <a:spLocks noGrp="1"/>
+          </p:cNvSpPr>
+          <p:nvPr>
+            <p:ph sz="half" idx="1"/>
+          </p:nvPr>
+        </p:nvSpPr>
+        <p:spPr>
+          <a:xfrm>
+            <a:off x="838200" y="1825625"/>
+            <a:ext cx="5181600" cy="4351338"/>
+          </a:xfrm>
+        </p:spPr>
+        <p:txBody>
+          <a:bodyPr/>
+          <a:lstStyle/>
+          <a:p>
+            <a:pPr lvl="0"/>
+            <a:r>
+              <a:rPr lang="en-US" smtClean="0"/>
+              <a:t>Click to edit Master text styles</a:t>
+            </a:r>
+          </a:p>
+          <a:p>
+            <a:pPr lvl="1"/>
+            <a:r>
+              <a:rPr lang="en-US" smtClean="0"/>
+              <a:t>Second level</a:t>
+            </a:r>
+          </a:p>
+          <a:p>
+            <a:pPr lvl="2"/>
+            <a:r>
+              <a:rPr lang="en-US" smtClean="0"/>
+              <a:t>Third level</a:t>
+            </a:r>
+          </a:p>
+          <a:p>
+            <a:pPr lvl="3"/>
+            <a:r>
+              <a:rPr lang="en-US" smtClean="0"/>
+              <a:t>Fourth level</a:t>
+            </a:r>
+          </a:p>
+          <a:p>
+            <a:pPr lvl="4"/>
+            <a:r>
+              <a:rPr lang="en-US" smtClean="0"/>
+              <a:t>Fifth level</a:t>
+            </a:r>
+            <a:endParaRPr lang="en-US"/>
+          </a:p>
+        </p:txBody>
+      </p:sp>
+      <p:sp>
+        <p:nvSpPr>
+          <p:cNvPr id="4" name="Content Placeholder 3"/>
+          <p:cNvSpPr>
+            <a:spLocks noGrp="1"/>
+          </p:cNvSpPr>
+          <p:nvPr>
+            <p:ph sz="half" idx="2"/>
+          </p:nvPr>
+        </p:nvSpPr>
+        <p:spPr>
+          <a:xfrm>
+            <a:off x="6172200" y="1825625"/>
+            <a:ext cx="5181600" cy="4351338"/>
+          </a:xfrm>
+        </p:spPr>
+        <p:txBody>
+          <a:bodyPr/>
+          <a:lstStyle/>
+          <a:p>
+            <a:pPr lvl="0"/>
+            <a:r>
+              <a:rPr lang="en-US" dirty="0" smtClean="0"/>
+              <a:t>Click to edit Master text styles</a:t>
+            </a:r>
+          </a:p>
+          <a:p>
+            <a:pPr lvl="1"/>
+            <a:r>
+              <a:rPr lang="en-US" dirty="0" smtClean="0"/>
+              <a:t>Second level</a:t>
+            </a:r>
+          </a:p>
+          <a:p>
+            <a:pPr lvl="2"/>
+            <a:r>
+              <a:rPr lang="en-US" dirty="0" smtClean="0"/>
+              <a:t>Third level</a:t>
+            </a:r>
+          </a:p>
+          <a:p>
+            <a:pPr lvl="3"/>
+            <a:r>
+              <a:rPr lang="en-US" dirty="0" smtClean="0"/>
+              <a:t>Fourth level</a:t>
+            </a:r>
+          </a:p>
+          <a:p>
+            <a:pPr lvl="4"/>
+            <a:r>
+              <a:rPr lang="en-US" dirty="0" smtClean="0"/>
+              <a:t>Fifth level</a:t>
+            </a:r>
+            <a:endParaRPr lang="en-US" dirty="0"/>
+          </a:p>
+        </p:txBody>
+      </p:sp>
+      <p:sp>
+        <p:nvSpPr>
+          <p:cNvPr id="5" name="Date Placeholder 4"/>
+          <p:cNvSpPr>
+            <a:spLocks noGrp="1"/>
+          </p:cNvSpPr>
+          <p:nvPr>
+            <p:ph type="dt" sz="half" idx="10"/>
+          </p:nvPr>
+        </p:nvSpPr>
+        <p:spPr/>
+        <p:txBody>
+          <a:bodyPr/>
+          <a:lstStyle/>
+          <a:p>
+            <a:fld id="{C8A9F8E6-4BC3-4202-8597-429C04A5B1F9}" type="datetimeFigureOut">
+              <a:rPr lang="en-US" smtClean="0"/>
+              <a:t>5/19/2015</a:t>
+            </a:fld>
+            <a:endParaRPr lang="en-US"/>
+          </a:p>
+        </p:txBody>
+      </p:sp>
+      <p:sp>
+        <p:nvSpPr>
+          <p:cNvPr id="6" name="Footer Placeholder 5"/>
+          <p:cNvSpPr>
+            <a:spLocks noGrp="1"/>
+          </p:cNvSpPr>
+          <p:nvPr>
+            <p:ph type="ftr" sz="quarter" idx="11"/>
+          </p:nvPr>
+        </p:nvSpPr>
+        <p:spPr/>
+        <p:txBody>
+          <a:bodyPr/>
+          <a:lstStyle/>
+          <a:p>
+            <a:endParaRPr lang="en-US"/>
+          </a:p>
+        </p:txBody>
+      </p:sp>
+      <p:sp>
+        <p:nvSpPr>
+          <p:cNvPr id="7" name="Slide Number Placeholder 6"/>
+          <p:cNvSpPr>
+            <a:spLocks noGrp="1"/>
+          </p:cNvSpPr>
+          <p:nvPr>
+            <p:ph type="sldNum" sz="quarter" idx="12"/>
+          </p:nvPr>
+        </p:nvSpPr>
+        <p:spPr/>
+        <p:txBody>
+          <a:bodyPr/>
+          <a:lstStyle/>
+          <a:p>
+            <a:fld id="{C01F2AEF-5F40-4DB4-9E0D-8EEE1B8C1150}" type="slidenum">
+              <a:rPr lang="en-US" smtClean="0"/>
+              <a:t>‹#›</a:t>
+            </a:fld>
+            <a:endParaRPr lang="en-US"/>
+          </a:p>
+        </p:txBody>
+      </p:sp>
+    </p:spTree>
+    <p:extLst>
+      <p:ext uri="{BB962C8B-B14F-4D97-AF65-F5344CB8AC3E}">
+        <p14:creationId xmlns:p14="http://schemas.microsoft.com/office/powerpoint/2010/main" val="3239691698"/>
+      </p:ext>
+    </p:extLst>
+  </p:cSld>
+  <p:clrMapOvr>
+    <a:masterClrMapping/>
+  </p:clrMapOvr>
+</p:sldLayout>
+</file>
+
+<file path=ppt/slideLayouts/slideLayout6.xml><?xml version="1.0" encoding="utf-8"?>
 <p:sldLayout xmlns:a="http://schemas.openxmlformats.org/drawingml/2006/main" xmlns:r="http://schemas.openxmlformats.org/officeDocument/2006/relationships" xmlns:p="http://schemas.openxmlformats.org/presentationml/2006/main" type="twoTxTwoObj" preserve="1">
   <p:cSld name="Comparison">
     <p:spTree>
@@ -1434,38 +2217,38 @@
           <a:p>
             <a:pPr lvl="0"/>
             <a:r>
-              <a:rPr lang="en-US" smtClean="0"/>
+              <a:rPr lang="en-US" dirty="0" smtClean="0"/>
               <a:t>Click to edit Master text styles</a:t>
             </a:r>
           </a:p>
           <a:p>
             <a:pPr lvl="1"/>
             <a:r>
-              <a:rPr lang="en-US" smtClean="0"/>
+              <a:rPr lang="en-US" dirty="0" smtClean="0"/>
               <a:t>Second level</a:t>
             </a:r>
           </a:p>
           <a:p>
             <a:pPr lvl="2"/>
             <a:r>
-              <a:rPr lang="en-US" smtClean="0"/>
+              <a:rPr lang="en-US" dirty="0" smtClean="0"/>
               <a:t>Third level</a:t>
             </a:r>
           </a:p>
           <a:p>
             <a:pPr lvl="3"/>
             <a:r>
-              <a:rPr lang="en-US" smtClean="0"/>
+              <a:rPr lang="en-US" dirty="0" smtClean="0"/>
               <a:t>Fourth level</a:t>
             </a:r>
           </a:p>
           <a:p>
             <a:pPr lvl="4"/>
             <a:r>
-              <a:rPr lang="en-US" smtClean="0"/>
+              <a:rPr lang="en-US" dirty="0" smtClean="0"/>
               <a:t>Fifth level</a:t>
             </a:r>
-            <a:endParaRPr lang="en-US"/>
+            <a:endParaRPr lang="en-US" dirty="0"/>
           </a:p>
         </p:txBody>
       </p:sp>
@@ -1669,7 +2452,496 @@
 </p:sldLayout>
 </file>
 
-<file path=ppt/slideLayouts/slideLayout6.xml><?xml version="1.0" encoding="utf-8"?>
+<file path=ppt/slideLayouts/slideLayout7.xml><?xml version="1.0" encoding="utf-8"?>
+<p:sldLayout xmlns:a="http://schemas.openxmlformats.org/drawingml/2006/main" xmlns:r="http://schemas.openxmlformats.org/officeDocument/2006/relationships" xmlns:p="http://schemas.openxmlformats.org/presentationml/2006/main" preserve="1" userDrawn="1">
+  <p:cSld name="1_Comparison">
+    <p:spTree>
+      <p:nvGrpSpPr>
+        <p:cNvPr id="1" name=""/>
+        <p:cNvGrpSpPr/>
+        <p:nvPr/>
+      </p:nvGrpSpPr>
+      <p:grpSpPr>
+        <a:xfrm>
+          <a:off x="0" y="0"/>
+          <a:ext cx="0" cy="0"/>
+          <a:chOff x="0" y="0"/>
+          <a:chExt cx="0" cy="0"/>
+        </a:xfrm>
+      </p:grpSpPr>
+      <p:sp>
+        <p:nvSpPr>
+          <p:cNvPr id="2" name="Title 1"/>
+          <p:cNvSpPr>
+            <a:spLocks noGrp="1"/>
+          </p:cNvSpPr>
+          <p:nvPr>
+            <p:ph type="title"/>
+          </p:nvPr>
+        </p:nvSpPr>
+        <p:spPr>
+          <a:xfrm>
+            <a:off x="839788" y="365125"/>
+            <a:ext cx="10515600" cy="1325563"/>
+          </a:xfrm>
+        </p:spPr>
+        <p:txBody>
+          <a:bodyPr/>
+          <a:lstStyle/>
+          <a:p>
+            <a:r>
+              <a:rPr lang="en-US" smtClean="0"/>
+              <a:t>Click to edit Master title style</a:t>
+            </a:r>
+            <a:endParaRPr lang="en-US"/>
+          </a:p>
+        </p:txBody>
+      </p:sp>
+      <p:sp>
+        <p:nvSpPr>
+          <p:cNvPr id="3" name="Text Placeholder 2"/>
+          <p:cNvSpPr>
+            <a:spLocks noGrp="1"/>
+          </p:cNvSpPr>
+          <p:nvPr>
+            <p:ph type="body" idx="1"/>
+          </p:nvPr>
+        </p:nvSpPr>
+        <p:spPr>
+          <a:xfrm>
+            <a:off x="839788" y="1681163"/>
+            <a:ext cx="3200400" cy="823912"/>
+          </a:xfrm>
+        </p:spPr>
+        <p:txBody>
+          <a:bodyPr anchor="b"/>
+          <a:lstStyle>
+            <a:lvl1pPr marL="0" indent="0">
+              <a:buNone/>
+              <a:defRPr sz="2400" b="1"/>
+            </a:lvl1pPr>
+            <a:lvl2pPr marL="457200" indent="0">
+              <a:buNone/>
+              <a:defRPr sz="2000" b="1"/>
+            </a:lvl2pPr>
+            <a:lvl3pPr marL="914400" indent="0">
+              <a:buNone/>
+              <a:defRPr sz="1800" b="1"/>
+            </a:lvl3pPr>
+            <a:lvl4pPr marL="1371600" indent="0">
+              <a:buNone/>
+              <a:defRPr sz="1600" b="1"/>
+            </a:lvl4pPr>
+            <a:lvl5pPr marL="1828800" indent="0">
+              <a:buNone/>
+              <a:defRPr sz="1600" b="1"/>
+            </a:lvl5pPr>
+            <a:lvl6pPr marL="2286000" indent="0">
+              <a:buNone/>
+              <a:defRPr sz="1600" b="1"/>
+            </a:lvl6pPr>
+            <a:lvl7pPr marL="2743200" indent="0">
+              <a:buNone/>
+              <a:defRPr sz="1600" b="1"/>
+            </a:lvl7pPr>
+            <a:lvl8pPr marL="3200400" indent="0">
+              <a:buNone/>
+              <a:defRPr sz="1600" b="1"/>
+            </a:lvl8pPr>
+            <a:lvl9pPr marL="3657600" indent="0">
+              <a:buNone/>
+              <a:defRPr sz="1600" b="1"/>
+            </a:lvl9pPr>
+          </a:lstStyle>
+          <a:p>
+            <a:pPr lvl="0"/>
+            <a:r>
+              <a:rPr lang="en-US" smtClean="0"/>
+              <a:t>Click to edit Master text styles</a:t>
+            </a:r>
+          </a:p>
+        </p:txBody>
+      </p:sp>
+      <p:sp>
+        <p:nvSpPr>
+          <p:cNvPr id="4" name="Content Placeholder 3"/>
+          <p:cNvSpPr>
+            <a:spLocks noGrp="1"/>
+          </p:cNvSpPr>
+          <p:nvPr>
+            <p:ph sz="half" idx="2"/>
+          </p:nvPr>
+        </p:nvSpPr>
+        <p:spPr>
+          <a:xfrm>
+            <a:off x="839788" y="2505075"/>
+            <a:ext cx="3200400" cy="3684588"/>
+          </a:xfrm>
+        </p:spPr>
+        <p:txBody>
+          <a:bodyPr/>
+          <a:lstStyle/>
+          <a:p>
+            <a:pPr lvl="0"/>
+            <a:r>
+              <a:rPr lang="en-US" dirty="0" smtClean="0"/>
+              <a:t>Click to edit Master text styles</a:t>
+            </a:r>
+          </a:p>
+          <a:p>
+            <a:pPr lvl="1"/>
+            <a:r>
+              <a:rPr lang="en-US" dirty="0" smtClean="0"/>
+              <a:t>Second level</a:t>
+            </a:r>
+          </a:p>
+          <a:p>
+            <a:pPr lvl="2"/>
+            <a:r>
+              <a:rPr lang="en-US" dirty="0" smtClean="0"/>
+              <a:t>Third level</a:t>
+            </a:r>
+          </a:p>
+          <a:p>
+            <a:pPr lvl="3"/>
+            <a:r>
+              <a:rPr lang="en-US" dirty="0" smtClean="0"/>
+              <a:t>Fourth level</a:t>
+            </a:r>
+          </a:p>
+          <a:p>
+            <a:pPr lvl="4"/>
+            <a:r>
+              <a:rPr lang="en-US" dirty="0" smtClean="0"/>
+              <a:t>Fifth level</a:t>
+            </a:r>
+            <a:endParaRPr lang="en-US" dirty="0"/>
+          </a:p>
+        </p:txBody>
+      </p:sp>
+      <p:sp>
+        <p:nvSpPr>
+          <p:cNvPr id="5" name="Text Placeholder 4"/>
+          <p:cNvSpPr>
+            <a:spLocks noGrp="1"/>
+          </p:cNvSpPr>
+          <p:nvPr>
+            <p:ph type="body" sz="quarter" idx="3"/>
+          </p:nvPr>
+        </p:nvSpPr>
+        <p:spPr>
+          <a:xfrm>
+            <a:off x="4496594" y="1681163"/>
+            <a:ext cx="3200400" cy="823912"/>
+          </a:xfrm>
+        </p:spPr>
+        <p:txBody>
+          <a:bodyPr anchor="b"/>
+          <a:lstStyle>
+            <a:lvl1pPr marL="0" indent="0">
+              <a:buNone/>
+              <a:defRPr sz="2400" b="1"/>
+            </a:lvl1pPr>
+            <a:lvl2pPr marL="457200" indent="0">
+              <a:buNone/>
+              <a:defRPr sz="2000" b="1"/>
+            </a:lvl2pPr>
+            <a:lvl3pPr marL="914400" indent="0">
+              <a:buNone/>
+              <a:defRPr sz="1800" b="1"/>
+            </a:lvl3pPr>
+            <a:lvl4pPr marL="1371600" indent="0">
+              <a:buNone/>
+              <a:defRPr sz="1600" b="1"/>
+            </a:lvl4pPr>
+            <a:lvl5pPr marL="1828800" indent="0">
+              <a:buNone/>
+              <a:defRPr sz="1600" b="1"/>
+            </a:lvl5pPr>
+            <a:lvl6pPr marL="2286000" indent="0">
+              <a:buNone/>
+              <a:defRPr sz="1600" b="1"/>
+            </a:lvl6pPr>
+            <a:lvl7pPr marL="2743200" indent="0">
+              <a:buNone/>
+              <a:defRPr sz="1600" b="1"/>
+            </a:lvl7pPr>
+            <a:lvl8pPr marL="3200400" indent="0">
+              <a:buNone/>
+              <a:defRPr sz="1600" b="1"/>
+            </a:lvl8pPr>
+            <a:lvl9pPr marL="3657600" indent="0">
+              <a:buNone/>
+              <a:defRPr sz="1600" b="1"/>
+            </a:lvl9pPr>
+          </a:lstStyle>
+          <a:p>
+            <a:pPr lvl="0"/>
+            <a:r>
+              <a:rPr lang="en-US" dirty="0" smtClean="0"/>
+              <a:t>Click to edit Master text styles</a:t>
+            </a:r>
+          </a:p>
+        </p:txBody>
+      </p:sp>
+      <p:sp>
+        <p:nvSpPr>
+          <p:cNvPr id="6" name="Content Placeholder 5"/>
+          <p:cNvSpPr>
+            <a:spLocks noGrp="1"/>
+          </p:cNvSpPr>
+          <p:nvPr>
+            <p:ph sz="quarter" idx="4"/>
+          </p:nvPr>
+        </p:nvSpPr>
+        <p:spPr>
+          <a:xfrm>
+            <a:off x="4496594" y="2505075"/>
+            <a:ext cx="3200400" cy="3684588"/>
+          </a:xfrm>
+        </p:spPr>
+        <p:txBody>
+          <a:bodyPr/>
+          <a:lstStyle/>
+          <a:p>
+            <a:pPr lvl="0"/>
+            <a:r>
+              <a:rPr lang="en-US" dirty="0" smtClean="0"/>
+              <a:t>Click to edit Master text styles</a:t>
+            </a:r>
+          </a:p>
+          <a:p>
+            <a:pPr lvl="1"/>
+            <a:r>
+              <a:rPr lang="en-US" dirty="0" smtClean="0"/>
+              <a:t>Second level</a:t>
+            </a:r>
+          </a:p>
+          <a:p>
+            <a:pPr lvl="2"/>
+            <a:r>
+              <a:rPr lang="en-US" dirty="0" smtClean="0"/>
+              <a:t>Third level</a:t>
+            </a:r>
+          </a:p>
+          <a:p>
+            <a:pPr lvl="3"/>
+            <a:r>
+              <a:rPr lang="en-US" dirty="0" smtClean="0"/>
+              <a:t>Fourth level</a:t>
+            </a:r>
+          </a:p>
+          <a:p>
+            <a:pPr lvl="4"/>
+            <a:r>
+              <a:rPr lang="en-US" dirty="0" smtClean="0"/>
+              <a:t>Fifth level</a:t>
+            </a:r>
+            <a:endParaRPr lang="en-US" dirty="0"/>
+          </a:p>
+        </p:txBody>
+      </p:sp>
+      <p:sp>
+        <p:nvSpPr>
+          <p:cNvPr id="7" name="Date Placeholder 6"/>
+          <p:cNvSpPr>
+            <a:spLocks noGrp="1"/>
+          </p:cNvSpPr>
+          <p:nvPr>
+            <p:ph type="dt" sz="half" idx="10"/>
+          </p:nvPr>
+        </p:nvSpPr>
+        <p:spPr/>
+        <p:txBody>
+          <a:bodyPr/>
+          <a:lstStyle/>
+          <a:p>
+            <a:fld id="{C8A9F8E6-4BC3-4202-8597-429C04A5B1F9}" type="datetimeFigureOut">
+              <a:rPr lang="en-US" smtClean="0"/>
+              <a:t>5/19/2015</a:t>
+            </a:fld>
+            <a:endParaRPr lang="en-US"/>
+          </a:p>
+        </p:txBody>
+      </p:sp>
+      <p:sp>
+        <p:nvSpPr>
+          <p:cNvPr id="8" name="Footer Placeholder 7"/>
+          <p:cNvSpPr>
+            <a:spLocks noGrp="1"/>
+          </p:cNvSpPr>
+          <p:nvPr>
+            <p:ph type="ftr" sz="quarter" idx="11"/>
+          </p:nvPr>
+        </p:nvSpPr>
+        <p:spPr/>
+        <p:txBody>
+          <a:bodyPr/>
+          <a:lstStyle/>
+          <a:p>
+            <a:endParaRPr lang="en-US"/>
+          </a:p>
+        </p:txBody>
+      </p:sp>
+      <p:sp>
+        <p:nvSpPr>
+          <p:cNvPr id="9" name="Slide Number Placeholder 8"/>
+          <p:cNvSpPr>
+            <a:spLocks noGrp="1"/>
+          </p:cNvSpPr>
+          <p:nvPr>
+            <p:ph type="sldNum" sz="quarter" idx="12"/>
+          </p:nvPr>
+        </p:nvSpPr>
+        <p:spPr/>
+        <p:txBody>
+          <a:bodyPr/>
+          <a:lstStyle/>
+          <a:p>
+            <a:fld id="{C01F2AEF-5F40-4DB4-9E0D-8EEE1B8C1150}" type="slidenum">
+              <a:rPr lang="en-US" smtClean="0"/>
+              <a:t>‹#›</a:t>
+            </a:fld>
+            <a:endParaRPr lang="en-US"/>
+          </a:p>
+        </p:txBody>
+      </p:sp>
+      <p:sp>
+        <p:nvSpPr>
+          <p:cNvPr id="10" name="Text Placeholder 4"/>
+          <p:cNvSpPr>
+            <a:spLocks noGrp="1"/>
+          </p:cNvSpPr>
+          <p:nvPr>
+            <p:ph type="body" sz="quarter" idx="13"/>
+          </p:nvPr>
+        </p:nvSpPr>
+        <p:spPr>
+          <a:xfrm>
+            <a:off x="8153400" y="1681163"/>
+            <a:ext cx="3200400" cy="823912"/>
+          </a:xfrm>
+        </p:spPr>
+        <p:txBody>
+          <a:bodyPr anchor="b"/>
+          <a:lstStyle>
+            <a:lvl1pPr marL="0" indent="0">
+              <a:buNone/>
+              <a:defRPr sz="2400" b="1"/>
+            </a:lvl1pPr>
+            <a:lvl2pPr marL="457200" indent="0">
+              <a:buNone/>
+              <a:defRPr sz="2000" b="1"/>
+            </a:lvl2pPr>
+            <a:lvl3pPr marL="914400" indent="0">
+              <a:buNone/>
+              <a:defRPr sz="1800" b="1"/>
+            </a:lvl3pPr>
+            <a:lvl4pPr marL="1371600" indent="0">
+              <a:buNone/>
+              <a:defRPr sz="1600" b="1"/>
+            </a:lvl4pPr>
+            <a:lvl5pPr marL="1828800" indent="0">
+              <a:buNone/>
+              <a:defRPr sz="1600" b="1"/>
+            </a:lvl5pPr>
+            <a:lvl6pPr marL="2286000" indent="0">
+              <a:buNone/>
+              <a:defRPr sz="1600" b="1"/>
+            </a:lvl6pPr>
+            <a:lvl7pPr marL="2743200" indent="0">
+              <a:buNone/>
+              <a:defRPr sz="1600" b="1"/>
+            </a:lvl7pPr>
+            <a:lvl8pPr marL="3200400" indent="0">
+              <a:buNone/>
+              <a:defRPr sz="1600" b="1"/>
+            </a:lvl8pPr>
+            <a:lvl9pPr marL="3657600" indent="0">
+              <a:buNone/>
+              <a:defRPr sz="1600" b="1"/>
+            </a:lvl9pPr>
+          </a:lstStyle>
+          <a:p>
+            <a:pPr lvl="0"/>
+            <a:r>
+              <a:rPr lang="en-US" dirty="0" smtClean="0"/>
+              <a:t>Click to edit Master text styles</a:t>
+            </a:r>
+          </a:p>
+        </p:txBody>
+      </p:sp>
+      <p:sp>
+        <p:nvSpPr>
+          <p:cNvPr id="11" name="Content Placeholder 5"/>
+          <p:cNvSpPr>
+            <a:spLocks noGrp="1"/>
+          </p:cNvSpPr>
+          <p:nvPr>
+            <p:ph sz="quarter" idx="14"/>
+          </p:nvPr>
+        </p:nvSpPr>
+        <p:spPr>
+          <a:xfrm>
+            <a:off x="8153400" y="2505075"/>
+            <a:ext cx="3200400" cy="3684588"/>
+          </a:xfrm>
+        </p:spPr>
+        <p:txBody>
+          <a:bodyPr/>
+          <a:lstStyle/>
+          <a:p>
+            <a:pPr lvl="0"/>
+            <a:r>
+              <a:rPr lang="en-US" dirty="0" smtClean="0"/>
+              <a:t>Click to edit Master text styles</a:t>
+            </a:r>
+          </a:p>
+          <a:p>
+            <a:pPr lvl="1"/>
+            <a:r>
+              <a:rPr lang="en-US" dirty="0" smtClean="0"/>
+              <a:t>Second level</a:t>
+            </a:r>
+          </a:p>
+          <a:p>
+            <a:pPr lvl="2"/>
+            <a:r>
+              <a:rPr lang="en-US" dirty="0" smtClean="0"/>
+              <a:t>Third level</a:t>
+            </a:r>
+          </a:p>
+          <a:p>
+            <a:pPr lvl="3"/>
+            <a:r>
+              <a:rPr lang="en-US" dirty="0" smtClean="0"/>
+              <a:t>Fourth level</a:t>
+            </a:r>
+          </a:p>
+          <a:p>
+            <a:pPr lvl="4"/>
+            <a:r>
+              <a:rPr lang="en-US" dirty="0" smtClean="0"/>
+              <a:t>Fifth level</a:t>
+            </a:r>
+            <a:endParaRPr lang="en-US" dirty="0"/>
+          </a:p>
+        </p:txBody>
+      </p:sp>
+    </p:spTree>
+    <p:extLst>
+      <p:ext uri="{BB962C8B-B14F-4D97-AF65-F5344CB8AC3E}">
+        <p14:creationId xmlns:p14="http://schemas.microsoft.com/office/powerpoint/2010/main" val="4247089608"/>
+      </p:ext>
+    </p:extLst>
+  </p:cSld>
+  <p:clrMapOvr>
+    <a:masterClrMapping/>
+  </p:clrMapOvr>
+</p:sldLayout>
+</file>
+
+<file path=ppt/slideLayouts/slideLayout8.xml><?xml version="1.0" encoding="utf-8"?>
 <p:sldLayout xmlns:a="http://schemas.openxmlformats.org/drawingml/2006/main" xmlns:r="http://schemas.openxmlformats.org/officeDocument/2006/relationships" xmlns:p="http://schemas.openxmlformats.org/presentationml/2006/main" type="titleOnly" preserve="1">
   <p:cSld name="Title Only">
     <p:spTree>
@@ -1787,7 +3059,7 @@
 </p:sldLayout>
 </file>
 
-<file path=ppt/slideLayouts/slideLayout7.xml><?xml version="1.0" encoding="utf-8"?>
+<file path=ppt/slideLayouts/slideLayout9.xml><?xml version="1.0" encoding="utf-8"?>
 <p:sldLayout xmlns:a="http://schemas.openxmlformats.org/drawingml/2006/main" xmlns:r="http://schemas.openxmlformats.org/officeDocument/2006/relationships" xmlns:p="http://schemas.openxmlformats.org/presentationml/2006/main" type="blank" preserve="1">
   <p:cSld name="Blank">
     <p:spTree>
@@ -1873,536 +3145,6 @@
     <p:extLst>
       <p:ext uri="{BB962C8B-B14F-4D97-AF65-F5344CB8AC3E}">
         <p14:creationId xmlns:p14="http://schemas.microsoft.com/office/powerpoint/2010/main" val="3455920184"/>
-      </p:ext>
-    </p:extLst>
-  </p:cSld>
-  <p:clrMapOvr>
-    <a:masterClrMapping/>
-  </p:clrMapOvr>
-</p:sldLayout>
-</file>
-
-<file path=ppt/slideLayouts/slideLayout8.xml><?xml version="1.0" encoding="utf-8"?>
-<p:sldLayout xmlns:a="http://schemas.openxmlformats.org/drawingml/2006/main" xmlns:r="http://schemas.openxmlformats.org/officeDocument/2006/relationships" xmlns:p="http://schemas.openxmlformats.org/presentationml/2006/main" type="objTx" preserve="1">
-  <p:cSld name="Content with Caption">
-    <p:spTree>
-      <p:nvGrpSpPr>
-        <p:cNvPr id="1" name=""/>
-        <p:cNvGrpSpPr/>
-        <p:nvPr/>
-      </p:nvGrpSpPr>
-      <p:grpSpPr>
-        <a:xfrm>
-          <a:off x="0" y="0"/>
-          <a:ext cx="0" cy="0"/>
-          <a:chOff x="0" y="0"/>
-          <a:chExt cx="0" cy="0"/>
-        </a:xfrm>
-      </p:grpSpPr>
-      <p:sp>
-        <p:nvSpPr>
-          <p:cNvPr id="2" name="Title 1"/>
-          <p:cNvSpPr>
-            <a:spLocks noGrp="1"/>
-          </p:cNvSpPr>
-          <p:nvPr>
-            <p:ph type="title"/>
-          </p:nvPr>
-        </p:nvSpPr>
-        <p:spPr>
-          <a:xfrm>
-            <a:off x="839788" y="457200"/>
-            <a:ext cx="3932237" cy="1600200"/>
-          </a:xfrm>
-        </p:spPr>
-        <p:txBody>
-          <a:bodyPr anchor="b"/>
-          <a:lstStyle>
-            <a:lvl1pPr>
-              <a:defRPr sz="3200"/>
-            </a:lvl1pPr>
-          </a:lstStyle>
-          <a:p>
-            <a:r>
-              <a:rPr lang="en-US" smtClean="0"/>
-              <a:t>Click to edit Master title style</a:t>
-            </a:r>
-            <a:endParaRPr lang="en-US"/>
-          </a:p>
-        </p:txBody>
-      </p:sp>
-      <p:sp>
-        <p:nvSpPr>
-          <p:cNvPr id="3" name="Content Placeholder 2"/>
-          <p:cNvSpPr>
-            <a:spLocks noGrp="1"/>
-          </p:cNvSpPr>
-          <p:nvPr>
-            <p:ph idx="1"/>
-          </p:nvPr>
-        </p:nvSpPr>
-        <p:spPr>
-          <a:xfrm>
-            <a:off x="5183188" y="987425"/>
-            <a:ext cx="6172200" cy="4873625"/>
-          </a:xfrm>
-        </p:spPr>
-        <p:txBody>
-          <a:bodyPr/>
-          <a:lstStyle>
-            <a:lvl1pPr>
-              <a:defRPr sz="3200"/>
-            </a:lvl1pPr>
-            <a:lvl2pPr>
-              <a:defRPr sz="2800"/>
-            </a:lvl2pPr>
-            <a:lvl3pPr>
-              <a:defRPr sz="2400"/>
-            </a:lvl3pPr>
-            <a:lvl4pPr>
-              <a:defRPr sz="2000"/>
-            </a:lvl4pPr>
-            <a:lvl5pPr>
-              <a:defRPr sz="2000"/>
-            </a:lvl5pPr>
-            <a:lvl6pPr>
-              <a:defRPr sz="2000"/>
-            </a:lvl6pPr>
-            <a:lvl7pPr>
-              <a:defRPr sz="2000"/>
-            </a:lvl7pPr>
-            <a:lvl8pPr>
-              <a:defRPr sz="2000"/>
-            </a:lvl8pPr>
-            <a:lvl9pPr>
-              <a:defRPr sz="2000"/>
-            </a:lvl9pPr>
-          </a:lstStyle>
-          <a:p>
-            <a:pPr lvl="0"/>
-            <a:r>
-              <a:rPr lang="en-US" smtClean="0"/>
-              <a:t>Click to edit Master text styles</a:t>
-            </a:r>
-          </a:p>
-          <a:p>
-            <a:pPr lvl="1"/>
-            <a:r>
-              <a:rPr lang="en-US" smtClean="0"/>
-              <a:t>Second level</a:t>
-            </a:r>
-          </a:p>
-          <a:p>
-            <a:pPr lvl="2"/>
-            <a:r>
-              <a:rPr lang="en-US" smtClean="0"/>
-              <a:t>Third level</a:t>
-            </a:r>
-          </a:p>
-          <a:p>
-            <a:pPr lvl="3"/>
-            <a:r>
-              <a:rPr lang="en-US" smtClean="0"/>
-              <a:t>Fourth level</a:t>
-            </a:r>
-          </a:p>
-          <a:p>
-            <a:pPr lvl="4"/>
-            <a:r>
-              <a:rPr lang="en-US" smtClean="0"/>
-              <a:t>Fifth level</a:t>
-            </a:r>
-            <a:endParaRPr lang="en-US"/>
-          </a:p>
-        </p:txBody>
-      </p:sp>
-      <p:sp>
-        <p:nvSpPr>
-          <p:cNvPr id="4" name="Text Placeholder 3"/>
-          <p:cNvSpPr>
-            <a:spLocks noGrp="1"/>
-          </p:cNvSpPr>
-          <p:nvPr>
-            <p:ph type="body" sz="half" idx="2"/>
-          </p:nvPr>
-        </p:nvSpPr>
-        <p:spPr>
-          <a:xfrm>
-            <a:off x="839788" y="2057400"/>
-            <a:ext cx="3932237" cy="3811588"/>
-          </a:xfrm>
-        </p:spPr>
-        <p:txBody>
-          <a:bodyPr/>
-          <a:lstStyle>
-            <a:lvl1pPr marL="0" indent="0">
-              <a:buNone/>
-              <a:defRPr sz="1600"/>
-            </a:lvl1pPr>
-            <a:lvl2pPr marL="457200" indent="0">
-              <a:buNone/>
-              <a:defRPr sz="1400"/>
-            </a:lvl2pPr>
-            <a:lvl3pPr marL="914400" indent="0">
-              <a:buNone/>
-              <a:defRPr sz="1200"/>
-            </a:lvl3pPr>
-            <a:lvl4pPr marL="1371600" indent="0">
-              <a:buNone/>
-              <a:defRPr sz="1000"/>
-            </a:lvl4pPr>
-            <a:lvl5pPr marL="1828800" indent="0">
-              <a:buNone/>
-              <a:defRPr sz="1000"/>
-            </a:lvl5pPr>
-            <a:lvl6pPr marL="2286000" indent="0">
-              <a:buNone/>
-              <a:defRPr sz="1000"/>
-            </a:lvl6pPr>
-            <a:lvl7pPr marL="2743200" indent="0">
-              <a:buNone/>
-              <a:defRPr sz="1000"/>
-            </a:lvl7pPr>
-            <a:lvl8pPr marL="3200400" indent="0">
-              <a:buNone/>
-              <a:defRPr sz="1000"/>
-            </a:lvl8pPr>
-            <a:lvl9pPr marL="3657600" indent="0">
-              <a:buNone/>
-              <a:defRPr sz="1000"/>
-            </a:lvl9pPr>
-          </a:lstStyle>
-          <a:p>
-            <a:pPr lvl="0"/>
-            <a:r>
-              <a:rPr lang="en-US" smtClean="0"/>
-              <a:t>Click to edit Master text styles</a:t>
-            </a:r>
-          </a:p>
-        </p:txBody>
-      </p:sp>
-      <p:sp>
-        <p:nvSpPr>
-          <p:cNvPr id="5" name="Date Placeholder 4"/>
-          <p:cNvSpPr>
-            <a:spLocks noGrp="1"/>
-          </p:cNvSpPr>
-          <p:nvPr>
-            <p:ph type="dt" sz="half" idx="10"/>
-          </p:nvPr>
-        </p:nvSpPr>
-        <p:spPr/>
-        <p:txBody>
-          <a:bodyPr/>
-          <a:lstStyle/>
-          <a:p>
-            <a:fld id="{C8A9F8E6-4BC3-4202-8597-429C04A5B1F9}" type="datetimeFigureOut">
-              <a:rPr lang="en-US" smtClean="0"/>
-              <a:t>5/19/2015</a:t>
-            </a:fld>
-            <a:endParaRPr lang="en-US"/>
-          </a:p>
-        </p:txBody>
-      </p:sp>
-      <p:sp>
-        <p:nvSpPr>
-          <p:cNvPr id="6" name="Footer Placeholder 5"/>
-          <p:cNvSpPr>
-            <a:spLocks noGrp="1"/>
-          </p:cNvSpPr>
-          <p:nvPr>
-            <p:ph type="ftr" sz="quarter" idx="11"/>
-          </p:nvPr>
-        </p:nvSpPr>
-        <p:spPr/>
-        <p:txBody>
-          <a:bodyPr/>
-          <a:lstStyle/>
-          <a:p>
-            <a:endParaRPr lang="en-US"/>
-          </a:p>
-        </p:txBody>
-      </p:sp>
-      <p:sp>
-        <p:nvSpPr>
-          <p:cNvPr id="7" name="Slide Number Placeholder 6"/>
-          <p:cNvSpPr>
-            <a:spLocks noGrp="1"/>
-          </p:cNvSpPr>
-          <p:nvPr>
-            <p:ph type="sldNum" sz="quarter" idx="12"/>
-          </p:nvPr>
-        </p:nvSpPr>
-        <p:spPr/>
-        <p:txBody>
-          <a:bodyPr/>
-          <a:lstStyle/>
-          <a:p>
-            <a:fld id="{C01F2AEF-5F40-4DB4-9E0D-8EEE1B8C1150}" type="slidenum">
-              <a:rPr lang="en-US" smtClean="0"/>
-              <a:t>‹#›</a:t>
-            </a:fld>
-            <a:endParaRPr lang="en-US"/>
-          </a:p>
-        </p:txBody>
-      </p:sp>
-    </p:spTree>
-    <p:extLst>
-      <p:ext uri="{BB962C8B-B14F-4D97-AF65-F5344CB8AC3E}">
-        <p14:creationId xmlns:p14="http://schemas.microsoft.com/office/powerpoint/2010/main" val="2743341430"/>
-      </p:ext>
-    </p:extLst>
-  </p:cSld>
-  <p:clrMapOvr>
-    <a:masterClrMapping/>
-  </p:clrMapOvr>
-</p:sldLayout>
-</file>
-
-<file path=ppt/slideLayouts/slideLayout9.xml><?xml version="1.0" encoding="utf-8"?>
-<p:sldLayout xmlns:a="http://schemas.openxmlformats.org/drawingml/2006/main" xmlns:r="http://schemas.openxmlformats.org/officeDocument/2006/relationships" xmlns:p="http://schemas.openxmlformats.org/presentationml/2006/main" type="picTx" preserve="1">
-  <p:cSld name="Picture with Caption">
-    <p:spTree>
-      <p:nvGrpSpPr>
-        <p:cNvPr id="1" name=""/>
-        <p:cNvGrpSpPr/>
-        <p:nvPr/>
-      </p:nvGrpSpPr>
-      <p:grpSpPr>
-        <a:xfrm>
-          <a:off x="0" y="0"/>
-          <a:ext cx="0" cy="0"/>
-          <a:chOff x="0" y="0"/>
-          <a:chExt cx="0" cy="0"/>
-        </a:xfrm>
-      </p:grpSpPr>
-      <p:sp>
-        <p:nvSpPr>
-          <p:cNvPr id="2" name="Title 1"/>
-          <p:cNvSpPr>
-            <a:spLocks noGrp="1"/>
-          </p:cNvSpPr>
-          <p:nvPr>
-            <p:ph type="title"/>
-          </p:nvPr>
-        </p:nvSpPr>
-        <p:spPr>
-          <a:xfrm>
-            <a:off x="839788" y="457200"/>
-            <a:ext cx="3932237" cy="1600200"/>
-          </a:xfrm>
-        </p:spPr>
-        <p:txBody>
-          <a:bodyPr anchor="b"/>
-          <a:lstStyle>
-            <a:lvl1pPr>
-              <a:defRPr sz="3200"/>
-            </a:lvl1pPr>
-          </a:lstStyle>
-          <a:p>
-            <a:r>
-              <a:rPr lang="en-US" smtClean="0"/>
-              <a:t>Click to edit Master title style</a:t>
-            </a:r>
-            <a:endParaRPr lang="en-US"/>
-          </a:p>
-        </p:txBody>
-      </p:sp>
-      <p:sp>
-        <p:nvSpPr>
-          <p:cNvPr id="3" name="Picture Placeholder 2"/>
-          <p:cNvSpPr>
-            <a:spLocks noGrp="1"/>
-          </p:cNvSpPr>
-          <p:nvPr>
-            <p:ph type="pic" idx="1"/>
-          </p:nvPr>
-        </p:nvSpPr>
-        <p:spPr>
-          <a:xfrm>
-            <a:off x="5183188" y="987425"/>
-            <a:ext cx="6172200" cy="4873625"/>
-          </a:xfrm>
-        </p:spPr>
-        <p:txBody>
-          <a:bodyPr/>
-          <a:lstStyle>
-            <a:lvl1pPr marL="0" indent="0">
-              <a:buNone/>
-              <a:defRPr sz="3200"/>
-            </a:lvl1pPr>
-            <a:lvl2pPr marL="457200" indent="0">
-              <a:buNone/>
-              <a:defRPr sz="2800"/>
-            </a:lvl2pPr>
-            <a:lvl3pPr marL="914400" indent="0">
-              <a:buNone/>
-              <a:defRPr sz="2400"/>
-            </a:lvl3pPr>
-            <a:lvl4pPr marL="1371600" indent="0">
-              <a:buNone/>
-              <a:defRPr sz="2000"/>
-            </a:lvl4pPr>
-            <a:lvl5pPr marL="1828800" indent="0">
-              <a:buNone/>
-              <a:defRPr sz="2000"/>
-            </a:lvl5pPr>
-            <a:lvl6pPr marL="2286000" indent="0">
-              <a:buNone/>
-              <a:defRPr sz="2000"/>
-            </a:lvl6pPr>
-            <a:lvl7pPr marL="2743200" indent="0">
-              <a:buNone/>
-              <a:defRPr sz="2000"/>
-            </a:lvl7pPr>
-            <a:lvl8pPr marL="3200400" indent="0">
-              <a:buNone/>
-              <a:defRPr sz="2000"/>
-            </a:lvl8pPr>
-            <a:lvl9pPr marL="3657600" indent="0">
-              <a:buNone/>
-              <a:defRPr sz="2000"/>
-            </a:lvl9pPr>
-          </a:lstStyle>
-          <a:p>
-            <a:endParaRPr lang="en-US"/>
-          </a:p>
-        </p:txBody>
-      </p:sp>
-      <p:sp>
-        <p:nvSpPr>
-          <p:cNvPr id="4" name="Text Placeholder 3"/>
-          <p:cNvSpPr>
-            <a:spLocks noGrp="1"/>
-          </p:cNvSpPr>
-          <p:nvPr>
-            <p:ph type="body" sz="half" idx="2"/>
-          </p:nvPr>
-        </p:nvSpPr>
-        <p:spPr>
-          <a:xfrm>
-            <a:off x="839788" y="2057400"/>
-            <a:ext cx="3932237" cy="3811588"/>
-          </a:xfrm>
-        </p:spPr>
-        <p:txBody>
-          <a:bodyPr/>
-          <a:lstStyle>
-            <a:lvl1pPr marL="0" indent="0">
-              <a:buNone/>
-              <a:defRPr sz="1600"/>
-            </a:lvl1pPr>
-            <a:lvl2pPr marL="457200" indent="0">
-              <a:buNone/>
-              <a:defRPr sz="1400"/>
-            </a:lvl2pPr>
-            <a:lvl3pPr marL="914400" indent="0">
-              <a:buNone/>
-              <a:defRPr sz="1200"/>
-            </a:lvl3pPr>
-            <a:lvl4pPr marL="1371600" indent="0">
-              <a:buNone/>
-              <a:defRPr sz="1000"/>
-            </a:lvl4pPr>
-            <a:lvl5pPr marL="1828800" indent="0">
-              <a:buNone/>
-              <a:defRPr sz="1000"/>
-            </a:lvl5pPr>
-            <a:lvl6pPr marL="2286000" indent="0">
-              <a:buNone/>
-              <a:defRPr sz="1000"/>
-            </a:lvl6pPr>
-            <a:lvl7pPr marL="2743200" indent="0">
-              <a:buNone/>
-              <a:defRPr sz="1000"/>
-            </a:lvl7pPr>
-            <a:lvl8pPr marL="3200400" indent="0">
-              <a:buNone/>
-              <a:defRPr sz="1000"/>
-            </a:lvl8pPr>
-            <a:lvl9pPr marL="3657600" indent="0">
-              <a:buNone/>
-              <a:defRPr sz="1000"/>
-            </a:lvl9pPr>
-          </a:lstStyle>
-          <a:p>
-            <a:pPr lvl="0"/>
-            <a:r>
-              <a:rPr lang="en-US" smtClean="0"/>
-              <a:t>Click to edit Master text styles</a:t>
-            </a:r>
-          </a:p>
-        </p:txBody>
-      </p:sp>
-      <p:sp>
-        <p:nvSpPr>
-          <p:cNvPr id="5" name="Date Placeholder 4"/>
-          <p:cNvSpPr>
-            <a:spLocks noGrp="1"/>
-          </p:cNvSpPr>
-          <p:nvPr>
-            <p:ph type="dt" sz="half" idx="10"/>
-          </p:nvPr>
-        </p:nvSpPr>
-        <p:spPr/>
-        <p:txBody>
-          <a:bodyPr/>
-          <a:lstStyle/>
-          <a:p>
-            <a:fld id="{C8A9F8E6-4BC3-4202-8597-429C04A5B1F9}" type="datetimeFigureOut">
-              <a:rPr lang="en-US" smtClean="0"/>
-              <a:t>5/19/2015</a:t>
-            </a:fld>
-            <a:endParaRPr lang="en-US"/>
-          </a:p>
-        </p:txBody>
-      </p:sp>
-      <p:sp>
-        <p:nvSpPr>
-          <p:cNvPr id="6" name="Footer Placeholder 5"/>
-          <p:cNvSpPr>
-            <a:spLocks noGrp="1"/>
-          </p:cNvSpPr>
-          <p:nvPr>
-            <p:ph type="ftr" sz="quarter" idx="11"/>
-          </p:nvPr>
-        </p:nvSpPr>
-        <p:spPr/>
-        <p:txBody>
-          <a:bodyPr/>
-          <a:lstStyle/>
-          <a:p>
-            <a:endParaRPr lang="en-US"/>
-          </a:p>
-        </p:txBody>
-      </p:sp>
-      <p:sp>
-        <p:nvSpPr>
-          <p:cNvPr id="7" name="Slide Number Placeholder 6"/>
-          <p:cNvSpPr>
-            <a:spLocks noGrp="1"/>
-          </p:cNvSpPr>
-          <p:nvPr>
-            <p:ph type="sldNum" sz="quarter" idx="12"/>
-          </p:nvPr>
-        </p:nvSpPr>
-        <p:spPr/>
-        <p:txBody>
-          <a:bodyPr/>
-          <a:lstStyle/>
-          <a:p>
-            <a:fld id="{C01F2AEF-5F40-4DB4-9E0D-8EEE1B8C1150}" type="slidenum">
-              <a:rPr lang="en-US" smtClean="0"/>
-              <a:t>‹#›</a:t>
-            </a:fld>
-            <a:endParaRPr lang="en-US"/>
-          </a:p>
-        </p:txBody>
-      </p:sp>
-    </p:spTree>
-    <p:extLst>
-      <p:ext uri="{BB962C8B-B14F-4D97-AF65-F5344CB8AC3E}">
-        <p14:creationId xmlns:p14="http://schemas.microsoft.com/office/powerpoint/2010/main" val="2190140718"/>
       </p:ext>
     </p:extLst>
   </p:cSld>
@@ -2661,13 +3403,15 @@
     <p:sldLayoutId id="2147483650" r:id="rId2"/>
     <p:sldLayoutId id="2147483651" r:id="rId3"/>
     <p:sldLayoutId id="2147483652" r:id="rId4"/>
-    <p:sldLayoutId id="2147483653" r:id="rId5"/>
-    <p:sldLayoutId id="2147483654" r:id="rId6"/>
-    <p:sldLayoutId id="2147483655" r:id="rId7"/>
-    <p:sldLayoutId id="2147483656" r:id="rId8"/>
-    <p:sldLayoutId id="2147483657" r:id="rId9"/>
-    <p:sldLayoutId id="2147483658" r:id="rId10"/>
-    <p:sldLayoutId id="2147483659" r:id="rId11"/>
+    <p:sldLayoutId id="2147483660" r:id="rId5"/>
+    <p:sldLayoutId id="2147483653" r:id="rId6"/>
+    <p:sldLayoutId id="2147483661" r:id="rId7"/>
+    <p:sldLayoutId id="2147483654" r:id="rId8"/>
+    <p:sldLayoutId id="2147483655" r:id="rId9"/>
+    <p:sldLayoutId id="2147483656" r:id="rId10"/>
+    <p:sldLayoutId id="2147483657" r:id="rId11"/>
+    <p:sldLayoutId id="2147483658" r:id="rId12"/>
+    <p:sldLayoutId id="2147483659" r:id="rId13"/>
   </p:sldLayoutIdLst>
   <p:txStyles>
     <p:titleStyle>
@@ -3087,58 +3831,117 @@
         </p:nvSpPr>
         <p:spPr/>
         <p:txBody>
-          <a:bodyPr/>
-          <a:lstStyle/>
-          <a:p>
-            <a:r>
-              <a:rPr lang="en-US" dirty="0" smtClean="0"/>
+          <a:bodyPr>
+            <a:noAutofit/>
+          </a:bodyPr>
+          <a:lstStyle/>
+          <a:p>
+            <a:pPr>
+              <a:lnSpc>
+                <a:spcPct val="135000"/>
+              </a:lnSpc>
+              <a:spcAft>
+                <a:spcPts val="600"/>
+              </a:spcAft>
+            </a:pPr>
+            <a:r>
+              <a:rPr lang="en-US" sz="2000" dirty="0" smtClean="0"/>
               <a:t>Vaccines as a whole are ineffective for HIV</a:t>
             </a:r>
           </a:p>
           <a:p>
-            <a:r>
-              <a:rPr lang="en-US" dirty="0" smtClean="0"/>
-              <a:t>However, new techniques show they can be effective on certain strains</a:t>
-            </a:r>
-          </a:p>
-          <a:p>
-            <a:r>
-              <a:rPr lang="en-US" dirty="0" smtClean="0"/>
-              <a:t>Which ones??</a:t>
-            </a:r>
-          </a:p>
-          <a:p>
-            <a:r>
-              <a:rPr lang="en-US" dirty="0" smtClean="0"/>
+            <a:pPr>
+              <a:lnSpc>
+                <a:spcPct val="135000"/>
+              </a:lnSpc>
+              <a:spcAft>
+                <a:spcPts val="600"/>
+              </a:spcAft>
+            </a:pPr>
+            <a:r>
+              <a:rPr lang="en-US" sz="2000" dirty="0" smtClean="0"/>
+              <a:t>However</a:t>
+            </a:r>
+            <a:r>
+              <a:rPr lang="en-US" sz="2000" dirty="0" smtClean="0"/>
+              <a:t>, new techniques show they can be effective on certain strains</a:t>
+            </a:r>
+          </a:p>
+          <a:p>
+            <a:pPr lvl="1">
+              <a:lnSpc>
+                <a:spcPct val="135000"/>
+              </a:lnSpc>
+              <a:spcAft>
+                <a:spcPts val="600"/>
+              </a:spcAft>
+            </a:pPr>
+            <a:r>
+              <a:rPr lang="en-US" sz="2000" dirty="0" smtClean="0"/>
+              <a:t>Which ones</a:t>
+            </a:r>
+            <a:r>
+              <a:rPr lang="en-US" sz="2000" dirty="0" smtClean="0"/>
+              <a:t>???</a:t>
+            </a:r>
+            <a:endParaRPr lang="en-US" sz="2000" dirty="0" smtClean="0"/>
+          </a:p>
+          <a:p>
+            <a:pPr>
+              <a:lnSpc>
+                <a:spcPct val="135000"/>
+              </a:lnSpc>
+              <a:spcAft>
+                <a:spcPts val="600"/>
+              </a:spcAft>
+            </a:pPr>
+            <a:r>
+              <a:rPr lang="en-US" sz="2000" dirty="0" smtClean="0"/>
               <a:t>Sieve analysis studies the similarities of the genomes the HIV in patients to the vaccine administered</a:t>
             </a:r>
-            <a:endParaRPr lang="en-US" dirty="0"/>
-          </a:p>
-          <a:p>
-            <a:r>
-              <a:rPr lang="en-US" dirty="0" smtClean="0"/>
+            <a:endParaRPr lang="en-US" sz="2000" dirty="0"/>
+          </a:p>
+          <a:p>
+            <a:pPr>
+              <a:lnSpc>
+                <a:spcPct val="135000"/>
+              </a:lnSpc>
+              <a:spcAft>
+                <a:spcPts val="600"/>
+              </a:spcAft>
+            </a:pPr>
+            <a:r>
+              <a:rPr lang="en-US" sz="2000" dirty="0" smtClean="0"/>
               <a:t>Our task: create an interactive visualization to aid in exploring this data.</a:t>
             </a:r>
           </a:p>
           <a:p>
-            <a:r>
-              <a:rPr lang="en-US" dirty="0" smtClean="0"/>
+            <a:pPr>
+              <a:lnSpc>
+                <a:spcPct val="135000"/>
+              </a:lnSpc>
+              <a:spcAft>
+                <a:spcPts val="600"/>
+              </a:spcAft>
+            </a:pPr>
+            <a:r>
+              <a:rPr lang="en-US" sz="2000" dirty="0" smtClean="0"/>
               <a:t>Working with Andrew </a:t>
             </a:r>
             <a:r>
-              <a:rPr lang="en-US" dirty="0" err="1" smtClean="0"/>
+              <a:rPr lang="en-US" sz="2000" dirty="0" err="1" smtClean="0"/>
               <a:t>Gartland</a:t>
             </a:r>
             <a:r>
-              <a:rPr lang="en-US" dirty="0" smtClean="0"/>
+              <a:rPr lang="en-US" sz="2000" dirty="0" smtClean="0"/>
               <a:t> and Allan </a:t>
             </a:r>
             <a:r>
-              <a:rPr lang="en-US" dirty="0" err="1" smtClean="0"/>
+              <a:rPr lang="en-US" sz="2000" dirty="0" err="1" smtClean="0"/>
               <a:t>DeCamp</a:t>
             </a:r>
             <a:r>
-              <a:rPr lang="en-US" dirty="0" smtClean="0"/>
+              <a:rPr lang="en-US" sz="2000" dirty="0" smtClean="0"/>
               <a:t> at Fred Hutch</a:t>
             </a:r>
           </a:p>
@@ -3202,10 +4005,14 @@
           <a:lstStyle/>
           <a:p>
             <a:r>
-              <a:rPr lang="en-US" dirty="0" smtClean="0"/>
-              <a:t>Prior Work</a:t>
-            </a:r>
-            <a:endParaRPr lang="en-US" dirty="0"/>
+              <a:rPr lang="en-US" dirty="0" smtClean="0">
+                <a:cs typeface="Aharoni" panose="02010803020104030203" pitchFamily="2" charset="-79"/>
+              </a:rPr>
+              <a:t>PRIOR WORK</a:t>
+            </a:r>
+            <a:endParaRPr lang="en-US" dirty="0">
+              <a:cs typeface="Aharoni" panose="02010803020104030203" pitchFamily="2" charset="-79"/>
+            </a:endParaRPr>
           </a:p>
         </p:txBody>
       </p:sp>
@@ -3629,7 +4436,7 @@
           <a:p>
             <a:r>
               <a:rPr lang="en-US" dirty="0" smtClean="0"/>
-              <a:t>S.I.E.V.E.: 3 parts so far</a:t>
+              <a:t>S.I.E.V.E.: 3 PARTS SO FAR</a:t>
             </a:r>
             <a:endParaRPr lang="en-US" dirty="0"/>
           </a:p>
@@ -3637,101 +4444,186 @@
       </p:sp>
       <p:sp>
         <p:nvSpPr>
-          <p:cNvPr id="3" name="Content Placeholder 2"/>
-          <p:cNvSpPr>
-            <a:spLocks noGrp="1"/>
-          </p:cNvSpPr>
-          <p:nvPr>
-            <p:ph idx="1"/>
+          <p:cNvPr id="8" name="Text Placeholder 7"/>
+          <p:cNvSpPr>
+            <a:spLocks noGrp="1"/>
+          </p:cNvSpPr>
+          <p:nvPr>
+            <p:ph type="body" idx="1"/>
           </p:nvPr>
         </p:nvSpPr>
         <p:spPr>
           <a:xfrm>
-            <a:off x="838200" y="1825625"/>
-            <a:ext cx="5063836" cy="4351338"/>
+            <a:off x="839788" y="2058600"/>
+            <a:ext cx="3200400" cy="906303"/>
           </a:xfrm>
         </p:spPr>
         <p:txBody>
-          <a:bodyPr/>
-          <a:lstStyle/>
-          <a:p>
-            <a:r>
-              <a:rPr lang="en-US" dirty="0" smtClean="0"/>
-              <a:t>Overview graphic/site selection</a:t>
-            </a:r>
-          </a:p>
-          <a:p>
-            <a:endParaRPr lang="en-US" dirty="0"/>
-          </a:p>
-          <a:p>
-            <a:pPr marL="0" indent="0">
-              <a:buNone/>
-            </a:pPr>
-            <a:endParaRPr lang="en-US" dirty="0" smtClean="0"/>
-          </a:p>
-          <a:p>
-            <a:r>
-              <a:rPr lang="en-US" dirty="0" smtClean="0"/>
-              <a:t>Group statistics</a:t>
-            </a:r>
-            <a:endParaRPr lang="en-US" dirty="0"/>
+          <a:bodyPr>
+            <a:noAutofit/>
+          </a:bodyPr>
+          <a:lstStyle/>
+          <a:p>
+            <a:r>
+              <a:rPr lang="en-US" sz="2600" b="0" dirty="0" smtClean="0">
+                <a:latin typeface="+mj-lt"/>
+              </a:rPr>
+              <a:t>Overview Graphic/</a:t>
+            </a:r>
+          </a:p>
+          <a:p>
+            <a:r>
+              <a:rPr lang="en-US" sz="2600" b="0" dirty="0" smtClean="0">
+                <a:latin typeface="+mj-lt"/>
+              </a:rPr>
+              <a:t>Site Selection</a:t>
+            </a:r>
+            <a:endParaRPr lang="en-US" sz="2600" b="0" dirty="0">
+              <a:latin typeface="+mj-lt"/>
+            </a:endParaRPr>
           </a:p>
         </p:txBody>
       </p:sp>
       <p:pic>
         <p:nvPicPr>
-          <p:cNvPr id="4" name="Picture 3"/>
+          <p:cNvPr id="17" name="Content Placeholder 16"/>
           <p:cNvPicPr>
-            <a:picLocks noChangeAspect="1"/>
+            <a:picLocks noGrp="1" noChangeAspect="1"/>
           </p:cNvPicPr>
-          <p:nvPr/>
+          <p:nvPr>
+            <p:ph sz="half" idx="2"/>
+          </p:nvPr>
         </p:nvPicPr>
         <p:blipFill>
-          <a:blip r:embed="rId2">
-            <a:extLst>
-              <a:ext uri="{28A0092B-C50C-407E-A947-70E740481C1C}">
-                <a14:useLocalDpi xmlns:a14="http://schemas.microsoft.com/office/drawing/2010/main" val="0"/>
-              </a:ext>
-            </a:extLst>
-          </a:blip>
+          <a:blip r:embed="rId2"/>
           <a:stretch>
             <a:fillRect/>
           </a:stretch>
         </p:blipFill>
         <p:spPr>
           <a:xfrm>
-            <a:off x="838200" y="2258238"/>
-            <a:ext cx="5482102" cy="1059253"/>
+            <a:off x="679768" y="3327369"/>
+            <a:ext cx="3520441" cy="680617"/>
           </a:xfrm>
           <a:prstGeom prst="rect">
             <a:avLst/>
           </a:prstGeom>
         </p:spPr>
       </p:pic>
+      <p:sp>
+        <p:nvSpPr>
+          <p:cNvPr id="9" name="Text Placeholder 8"/>
+          <p:cNvSpPr>
+            <a:spLocks noGrp="1"/>
+          </p:cNvSpPr>
+          <p:nvPr>
+            <p:ph type="body" sz="quarter" idx="3"/>
+          </p:nvPr>
+        </p:nvSpPr>
+        <p:spPr>
+          <a:xfrm>
+            <a:off x="4496594" y="2058600"/>
+            <a:ext cx="3200400" cy="906303"/>
+          </a:xfrm>
+        </p:spPr>
+        <p:txBody>
+          <a:bodyPr>
+            <a:noAutofit/>
+          </a:bodyPr>
+          <a:lstStyle/>
+          <a:p>
+            <a:r>
+              <a:rPr lang="en-US" sz="2600" b="0" dirty="0" smtClean="0">
+                <a:latin typeface="+mj-lt"/>
+              </a:rPr>
+              <a:t>Individual Site Charts</a:t>
+            </a:r>
+            <a:endParaRPr lang="en-US" sz="2600" b="0" dirty="0">
+              <a:latin typeface="+mj-lt"/>
+            </a:endParaRPr>
+          </a:p>
+        </p:txBody>
+      </p:sp>
       <p:pic>
         <p:nvPicPr>
-          <p:cNvPr id="5" name="Picture 4"/>
+          <p:cNvPr id="18" name="Content Placeholder 17"/>
           <p:cNvPicPr>
-            <a:picLocks noChangeAspect="1"/>
+            <a:picLocks noGrp="1" noChangeAspect="1"/>
           </p:cNvPicPr>
-          <p:nvPr/>
+          <p:nvPr>
+            <p:ph sz="quarter" idx="4"/>
+          </p:nvPr>
         </p:nvPicPr>
         <p:blipFill>
-          <a:blip r:embed="rId3">
-            <a:extLst>
-              <a:ext uri="{28A0092B-C50C-407E-A947-70E740481C1C}">
-                <a14:useLocalDpi xmlns:a14="http://schemas.microsoft.com/office/drawing/2010/main" val="0"/>
-              </a:ext>
-            </a:extLst>
-          </a:blip>
+          <a:blip r:embed="rId3"/>
           <a:stretch>
             <a:fillRect/>
           </a:stretch>
         </p:blipFill>
         <p:spPr>
           <a:xfrm>
-            <a:off x="6320302" y="2258238"/>
-            <a:ext cx="4058732" cy="3564626"/>
+            <a:off x="4337368" y="3217536"/>
+            <a:ext cx="3520441" cy="3096929"/>
+          </a:xfrm>
+          <a:prstGeom prst="rect">
+            <a:avLst/>
+          </a:prstGeom>
+        </p:spPr>
+      </p:pic>
+      <p:sp>
+        <p:nvSpPr>
+          <p:cNvPr id="15" name="Text Placeholder 14"/>
+          <p:cNvSpPr>
+            <a:spLocks noGrp="1"/>
+          </p:cNvSpPr>
+          <p:nvPr>
+            <p:ph type="body" sz="quarter" idx="13"/>
+          </p:nvPr>
+        </p:nvSpPr>
+        <p:spPr>
+          <a:xfrm>
+            <a:off x="8153400" y="2058600"/>
+            <a:ext cx="3200400" cy="906303"/>
+          </a:xfrm>
+        </p:spPr>
+        <p:txBody>
+          <a:bodyPr>
+            <a:noAutofit/>
+          </a:bodyPr>
+          <a:lstStyle/>
+          <a:p>
+            <a:r>
+              <a:rPr lang="en-US" sz="2600" b="0" dirty="0" smtClean="0">
+                <a:latin typeface="+mj-lt"/>
+              </a:rPr>
+              <a:t>Group Statistics</a:t>
+            </a:r>
+            <a:endParaRPr lang="en-US" sz="2600" b="0" dirty="0">
+              <a:latin typeface="+mj-lt"/>
+            </a:endParaRPr>
+          </a:p>
+        </p:txBody>
+      </p:sp>
+      <p:pic>
+        <p:nvPicPr>
+          <p:cNvPr id="19" name="Content Placeholder 18"/>
+          <p:cNvPicPr>
+            <a:picLocks noGrp="1" noChangeAspect="1"/>
+          </p:cNvPicPr>
+          <p:nvPr>
+            <p:ph sz="quarter" idx="14"/>
+          </p:nvPr>
+        </p:nvPicPr>
+        <p:blipFill>
+          <a:blip r:embed="rId4"/>
+          <a:stretch>
+            <a:fillRect/>
+          </a:stretch>
+        </p:blipFill>
+        <p:spPr>
+          <a:xfrm>
+            <a:off x="7993380" y="3263887"/>
+            <a:ext cx="3520441" cy="2077214"/>
           </a:xfrm>
           <a:prstGeom prst="rect">
             <a:avLst/>
@@ -3924,12 +4816,6 @@
             </a:lvl9pPr>
           </a:lstStyle>
           <a:p>
-            <a:r>
-              <a:rPr lang="en-US" dirty="0" smtClean="0"/>
-              <a:t>Individual site charts</a:t>
-            </a:r>
-          </a:p>
-          <a:p>
             <a:endParaRPr lang="en-US" dirty="0" smtClean="0"/>
           </a:p>
           <a:p>
@@ -3940,36 +4826,6 @@
           </a:p>
         </p:txBody>
       </p:sp>
-      <p:pic>
-        <p:nvPicPr>
-          <p:cNvPr id="7" name="Picture 6"/>
-          <p:cNvPicPr>
-            <a:picLocks noChangeAspect="1"/>
-          </p:cNvPicPr>
-          <p:nvPr/>
-        </p:nvPicPr>
-        <p:blipFill>
-          <a:blip r:embed="rId4">
-            <a:extLst>
-              <a:ext uri="{28A0092B-C50C-407E-A947-70E740481C1C}">
-                <a14:useLocalDpi xmlns:a14="http://schemas.microsoft.com/office/drawing/2010/main" val="0"/>
-              </a:ext>
-            </a:extLst>
-          </a:blip>
-          <a:stretch>
-            <a:fillRect/>
-          </a:stretch>
-        </p:blipFill>
-        <p:spPr>
-          <a:xfrm>
-            <a:off x="1497724" y="3885041"/>
-            <a:ext cx="4163053" cy="2458667"/>
-          </a:xfrm>
-          <a:prstGeom prst="rect">
-            <a:avLst/>
-          </a:prstGeom>
-        </p:spPr>
-      </p:pic>
     </p:spTree>
     <p:extLst>
       <p:ext uri="{BB962C8B-B14F-4D97-AF65-F5344CB8AC3E}">
@@ -4024,7 +4880,7 @@
           <a:p>
             <a:r>
               <a:rPr lang="en-US" dirty="0" smtClean="0"/>
-              <a:t>Works in progress:</a:t>
+              <a:t>WORKS IN PROGRESS:</a:t>
             </a:r>
             <a:endParaRPr lang="en-US" dirty="0"/>
           </a:p>
@@ -4040,36 +4896,68 @@
             <p:ph idx="1"/>
           </p:nvPr>
         </p:nvSpPr>
-        <p:spPr/>
-        <p:txBody>
-          <a:bodyPr/>
-          <a:lstStyle/>
-          <a:p>
-            <a:r>
-              <a:rPr lang="en-US" dirty="0" smtClean="0"/>
+        <p:spPr>
+          <a:xfrm>
+            <a:off x="838200" y="1571625"/>
+            <a:ext cx="9701784" cy="4605338"/>
+          </a:xfrm>
+        </p:spPr>
+        <p:txBody>
+          <a:bodyPr>
+            <a:noAutofit/>
+          </a:bodyPr>
+          <a:lstStyle/>
+          <a:p>
+            <a:pPr>
+              <a:lnSpc>
+                <a:spcPct val="105000"/>
+              </a:lnSpc>
+            </a:pPr>
+            <a:r>
+              <a:rPr lang="en-US" sz="2400" dirty="0" smtClean="0"/>
               <a:t>Better selection</a:t>
             </a:r>
           </a:p>
           <a:p>
-            <a:r>
-              <a:rPr lang="en-US" dirty="0" smtClean="0"/>
+            <a:pPr>
+              <a:lnSpc>
+                <a:spcPct val="105000"/>
+              </a:lnSpc>
+            </a:pPr>
+            <a:r>
+              <a:rPr lang="en-US" sz="2400" dirty="0" smtClean="0"/>
               <a:t>More statistics shown: visually encode statistically interesting sites to view</a:t>
             </a:r>
           </a:p>
           <a:p>
-            <a:r>
-              <a:rPr lang="en-US" dirty="0" smtClean="0"/>
+            <a:pPr>
+              <a:lnSpc>
+                <a:spcPct val="105000"/>
+              </a:lnSpc>
+            </a:pPr>
+            <a:r>
+              <a:rPr lang="en-US" sz="2400" dirty="0" smtClean="0"/>
               <a:t>Allow researchers to upload their own data for other vaccine studies</a:t>
             </a:r>
           </a:p>
           <a:p>
-            <a:r>
-              <a:rPr lang="en-US" dirty="0" smtClean="0"/>
+            <a:pPr>
+              <a:lnSpc>
+                <a:spcPct val="105000"/>
+              </a:lnSpc>
+            </a:pPr>
+            <a:r>
+              <a:rPr lang="en-US" sz="2400" dirty="0" smtClean="0"/>
               <a:t>Implement customization of colors, annotation of graphics, and export of images for use in sieve analysis papers</a:t>
             </a:r>
           </a:p>
           <a:p>
-            <a:endParaRPr lang="en-US" dirty="0"/>
+            <a:pPr>
+              <a:lnSpc>
+                <a:spcPct val="105000"/>
+              </a:lnSpc>
+            </a:pPr>
+            <a:endParaRPr lang="en-US" sz="2400" dirty="0"/>
           </a:p>
         </p:txBody>
       </p:sp>
@@ -4127,12 +5015,9 @@
           <a:p>
             <a:r>
               <a:rPr lang="en-US" dirty="0" smtClean="0"/>
-              <a:t>Feedback Solicitatio</a:t>
-            </a:r>
-            <a:r>
-              <a:rPr lang="en-US" dirty="0"/>
-              <a:t>n</a:t>
-            </a:r>
+              <a:t>FEEDBACK SOLICITATION</a:t>
+            </a:r>
+            <a:endParaRPr lang="en-US" dirty="0"/>
           </a:p>
         </p:txBody>
       </p:sp>
@@ -4146,38 +5031,93 @@
             <p:ph idx="1"/>
           </p:nvPr>
         </p:nvSpPr>
-        <p:spPr/>
-        <p:txBody>
-          <a:bodyPr/>
-          <a:lstStyle/>
-          <a:p>
-            <a:r>
-              <a:rPr lang="en-US" dirty="0" smtClean="0"/>
+        <p:spPr>
+          <a:xfrm>
+            <a:off x="838199" y="1571625"/>
+            <a:ext cx="9829800" cy="4605338"/>
+          </a:xfrm>
+        </p:spPr>
+        <p:txBody>
+          <a:bodyPr>
+            <a:noAutofit/>
+          </a:bodyPr>
+          <a:lstStyle/>
+          <a:p>
+            <a:pPr marL="0" indent="0">
+              <a:lnSpc>
+                <a:spcPct val="125000"/>
+              </a:lnSpc>
+              <a:buNone/>
+            </a:pPr>
+            <a:r>
+              <a:rPr lang="en-US" sz="2600" dirty="0" smtClean="0">
+                <a:latin typeface="+mj-lt"/>
+              </a:rPr>
               <a:t>What selection mechanism would work best for this type of data?</a:t>
             </a:r>
           </a:p>
           <a:p>
-            <a:pPr lvl="1"/>
+            <a:pPr lvl="1">
+              <a:lnSpc>
+                <a:spcPct val="125000"/>
+              </a:lnSpc>
+            </a:pPr>
             <a:r>
               <a:rPr lang="en-US" dirty="0" smtClean="0"/>
               <a:t>Data is in a very long sequence, but researchers need fine grained control</a:t>
             </a:r>
           </a:p>
           <a:p>
-            <a:pPr lvl="1"/>
+            <a:pPr lvl="1">
+              <a:lnSpc>
+                <a:spcPct val="125000"/>
+              </a:lnSpc>
+            </a:pPr>
             <a:r>
               <a:rPr lang="en-US" dirty="0" smtClean="0"/>
               <a:t>Ideally easily select multiple disconnected sequences across the genome, with ability to quickly select sequences of a specified length</a:t>
             </a:r>
           </a:p>
           <a:p>
-            <a:r>
-              <a:rPr lang="en-US" dirty="0" smtClean="0"/>
-              <a:t>Best way to export a D3 graphic to PDF format for inclusion in papers?</a:t>
-            </a:r>
-          </a:p>
-          <a:p>
-            <a:pPr lvl="1"/>
+            <a:pPr marL="0" indent="0">
+              <a:lnSpc>
+                <a:spcPct val="125000"/>
+              </a:lnSpc>
+              <a:buNone/>
+            </a:pPr>
+            <a:endParaRPr lang="en-US" sz="2400" b="1" dirty="0" smtClean="0">
+              <a:latin typeface="Calibri" panose="020F0502020204030204" pitchFamily="34" charset="0"/>
+              <a:cs typeface="BrowalliaUPC" panose="020B0604020202020204" pitchFamily="34" charset="-34"/>
+            </a:endParaRPr>
+          </a:p>
+          <a:p>
+            <a:pPr marL="0" indent="0">
+              <a:lnSpc>
+                <a:spcPct val="125000"/>
+              </a:lnSpc>
+              <a:buNone/>
+            </a:pPr>
+            <a:r>
+              <a:rPr lang="en-US" sz="2600" dirty="0" smtClean="0">
+                <a:latin typeface="+mj-lt"/>
+                <a:cs typeface="BrowalliaUPC" panose="020B0604020202020204" pitchFamily="34" charset="-34"/>
+              </a:rPr>
+              <a:t>Best </a:t>
+            </a:r>
+            <a:r>
+              <a:rPr lang="en-US" sz="2600" dirty="0" smtClean="0">
+                <a:latin typeface="+mj-lt"/>
+                <a:cs typeface="BrowalliaUPC" panose="020B0604020202020204" pitchFamily="34" charset="-34"/>
+              </a:rPr>
+              <a:t>way to export a D3 graphic to PDF format for inclusion in papers?</a:t>
+            </a:r>
+          </a:p>
+          <a:p>
+            <a:pPr lvl="1">
+              <a:lnSpc>
+                <a:spcPct val="125000"/>
+              </a:lnSpc>
+            </a:pPr>
             <a:r>
               <a:rPr lang="en-US" dirty="0" smtClean="0"/>
               <a:t>SVG is inconvenient for the researchers</a:t>
@@ -4246,76 +5186,16 @@
         <a:srgbClr val="954F72"/>
       </a:folHlink>
     </a:clrScheme>
-    <a:fontScheme name="Office">
+    <a:fontScheme name="Custom 2">
       <a:majorFont>
-        <a:latin typeface="Calibri Light" panose="020F0302020204030204"/>
+        <a:latin typeface="Calibri Light"/>
         <a:ea typeface=""/>
         <a:cs typeface=""/>
-        <a:font script="Jpan" typeface="ＭＳ Ｐゴシック"/>
-        <a:font script="Hang" typeface="맑은 고딕"/>
-        <a:font script="Hans" typeface="宋体"/>
-        <a:font script="Hant" typeface="新細明體"/>
-        <a:font script="Arab" typeface="Times New Roman"/>
-        <a:font script="Hebr" typeface="Times New Roman"/>
-        <a:font script="Thai" typeface="Angsana New"/>
-        <a:font script="Ethi" typeface="Nyala"/>
-        <a:font script="Beng" typeface="Vrinda"/>
-        <a:font script="Gujr" typeface="Shruti"/>
-        <a:font script="Khmr" typeface="MoolBoran"/>
-        <a:font script="Knda" typeface="Tunga"/>
-        <a:font script="Guru" typeface="Raavi"/>
-        <a:font script="Cans" typeface="Euphemia"/>
-        <a:font script="Cher" typeface="Plantagenet Cherokee"/>
-        <a:font script="Yiii" typeface="Microsoft Yi Baiti"/>
-        <a:font script="Tibt" typeface="Microsoft Himalaya"/>
-        <a:font script="Thaa" typeface="MV Boli"/>
-        <a:font script="Deva" typeface="Mangal"/>
-        <a:font script="Telu" typeface="Gautami"/>
-        <a:font script="Taml" typeface="Latha"/>
-        <a:font script="Syrc" typeface="Estrangelo Edessa"/>
-        <a:font script="Orya" typeface="Kalinga"/>
-        <a:font script="Mlym" typeface="Kartika"/>
-        <a:font script="Laoo" typeface="DokChampa"/>
-        <a:font script="Sinh" typeface="Iskoola Pota"/>
-        <a:font script="Mong" typeface="Mongolian Baiti"/>
-        <a:font script="Viet" typeface="Times New Roman"/>
-        <a:font script="Uigh" typeface="Microsoft Uighur"/>
-        <a:font script="Geor" typeface="Sylfaen"/>
       </a:majorFont>
       <a:minorFont>
-        <a:latin typeface="Calibri" panose="020F0502020204030204"/>
+        <a:latin typeface="Cambria"/>
         <a:ea typeface=""/>
         <a:cs typeface=""/>
-        <a:font script="Jpan" typeface="ＭＳ Ｐゴシック"/>
-        <a:font script="Hang" typeface="맑은 고딕"/>
-        <a:font script="Hans" typeface="宋体"/>
-        <a:font script="Hant" typeface="新細明體"/>
-        <a:font script="Arab" typeface="Arial"/>
-        <a:font script="Hebr" typeface="Arial"/>
-        <a:font script="Thai" typeface="Cordia New"/>
-        <a:font script="Ethi" typeface="Nyala"/>
-        <a:font script="Beng" typeface="Vrinda"/>
-        <a:font script="Gujr" typeface="Shruti"/>
-        <a:font script="Khmr" typeface="DaunPenh"/>
-        <a:font script="Knda" typeface="Tunga"/>
-        <a:font script="Guru" typeface="Raavi"/>
-        <a:font script="Cans" typeface="Euphemia"/>
-        <a:font script="Cher" typeface="Plantagenet Cherokee"/>
-        <a:font script="Yiii" typeface="Microsoft Yi Baiti"/>
-        <a:font script="Tibt" typeface="Microsoft Himalaya"/>
-        <a:font script="Thaa" typeface="MV Boli"/>
-        <a:font script="Deva" typeface="Mangal"/>
-        <a:font script="Telu" typeface="Gautami"/>
-        <a:font script="Taml" typeface="Latha"/>
-        <a:font script="Syrc" typeface="Estrangelo Edessa"/>
-        <a:font script="Orya" typeface="Kalinga"/>
-        <a:font script="Mlym" typeface="Kartika"/>
-        <a:font script="Laoo" typeface="DokChampa"/>
-        <a:font script="Sinh" typeface="Iskoola Pota"/>
-        <a:font script="Mong" typeface="Mongolian Baiti"/>
-        <a:font script="Viet" typeface="Arial"/>
-        <a:font script="Uigh" typeface="Microsoft Uighur"/>
-        <a:font script="Geor" typeface="Sylfaen"/>
       </a:minorFont>
     </a:fontScheme>
     <a:fmtScheme name="Office">

</xml_diff>